<commit_message>
Added more notes to XAML demo
</commit_message>
<xml_diff>
--- a/WhatsNewInWindows81/WhatsNewInWindows81.pptx
+++ b/WhatsNewInWindows81/WhatsNewInWindows81.pptx
@@ -1909,6 +1909,37 @@
               <a:buFontTx/>
               <a:buChar char="-"/>
             </a:pPr>
+            <a:endParaRPr lang="en-NZ" baseline="0" dirty="0" smtClean="0"/>
+          </a:p>
+          <a:p>
+            <a:pPr marL="0" indent="0">
+              <a:buFontTx/>
+              <a:buNone/>
+            </a:pPr>
+            <a:r>
+              <a:rPr lang="en-NZ" baseline="0" dirty="0" smtClean="0"/>
+              <a:t>Blend for Visual Studio</a:t>
+            </a:r>
+          </a:p>
+          <a:p>
+            <a:pPr marL="171450" indent="-171450">
+              <a:buFontTx/>
+              <a:buChar char="-"/>
+            </a:pPr>
+            <a:r>
+              <a:rPr lang="en-NZ" baseline="0" dirty="0" smtClean="0"/>
+              <a:t>Rulers and Guides</a:t>
+            </a:r>
+          </a:p>
+          <a:p>
+            <a:pPr marL="171450" indent="-171450">
+              <a:buFontTx/>
+              <a:buChar char="-"/>
+            </a:pPr>
+            <a:r>
+              <a:rPr lang="en-NZ" baseline="0" smtClean="0"/>
+              <a:t>Design Data</a:t>
+            </a:r>
             <a:endParaRPr lang="en-NZ" baseline="0" dirty="0" smtClean="0"/>
           </a:p>
           <a:p>
@@ -9835,6 +9866,21 @@
 </file>
 
 <file path=customXml/item1.xml><?xml version="1.0" encoding="utf-8"?>
+<p:properties xmlns:p="http://schemas.microsoft.com/office/2006/metadata/properties" xmlns:xsi="http://www.w3.org/2001/XMLSchema-instance">
+  <documentManagement/>
+</p:properties>
+</file>
+
+<file path=customXml/item2.xml><?xml version="1.0" encoding="utf-8"?>
+<?mso-contentType ?>
+<FormTemplates xmlns="http://schemas.microsoft.com/sharepoint/v3/contenttype/forms">
+  <Display>DocumentLibraryForm</Display>
+  <Edit>DocumentLibraryForm</Edit>
+  <New>DocumentLibraryForm</New>
+</FormTemplates>
+</file>
+
+<file path=customXml/item3.xml><?xml version="1.0" encoding="utf-8"?>
 <ct:contentTypeSchema xmlns:ct="http://schemas.microsoft.com/office/2006/metadata/contentType" xmlns:ma="http://schemas.microsoft.com/office/2006/metadata/properties/metaAttributes" ct:_="" ma:_="" ma:contentTypeName="Document" ma:contentTypeID="0x0101004DF6D0871B95904AABD22536D8AC85C8" ma:contentTypeVersion="0" ma:contentTypeDescription="Create a new document." ma:contentTypeScope="" ma:versionID="49efcf3338630220492e4247eaca93e8">
   <xsd:schema xmlns:xsd="http://www.w3.org/2001/XMLSchema" xmlns:p="http://schemas.microsoft.com/office/2006/metadata/properties" targetNamespace="http://schemas.microsoft.com/office/2006/metadata/properties" ma:root="true" ma:fieldsID="4aeb20c0e3442673af7ee10786458764">
     <xsd:element name="properties">
@@ -9883,32 +9929,10 @@
 </ct:contentTypeSchema>
 </file>
 
-<file path=customXml/item2.xml><?xml version="1.0" encoding="utf-8"?>
-<?mso-contentType ?>
-<FormTemplates xmlns="http://schemas.microsoft.com/sharepoint/v3/contenttype/forms">
-  <Display>DocumentLibraryForm</Display>
-  <Edit>DocumentLibraryForm</Edit>
-  <New>DocumentLibraryForm</New>
-</FormTemplates>
-</file>
-
-<file path=customXml/item3.xml><?xml version="1.0" encoding="utf-8"?>
-<p:properties xmlns:p="http://schemas.microsoft.com/office/2006/metadata/properties" xmlns:xsi="http://www.w3.org/2001/XMLSchema-instance">
-  <documentManagement/>
-</p:properties>
-</file>
-
 <file path=customXml/itemProps1.xml><?xml version="1.0" encoding="utf-8"?>
-<ds:datastoreItem xmlns:ds="http://schemas.openxmlformats.org/officeDocument/2006/customXml" ds:itemID="{7E1D9E91-416C-4888-A8AA-BE42FEF97FEF}">
+<ds:datastoreItem xmlns:ds="http://schemas.openxmlformats.org/officeDocument/2006/customXml" ds:itemID="{AEBD4C7A-EE81-430E-8E48-8F597B2AAF83}">
   <ds:schemaRefs>
-    <ds:schemaRef ds:uri="http://schemas.microsoft.com/office/2006/metadata/contentType"/>
-    <ds:schemaRef ds:uri="http://schemas.microsoft.com/office/2006/metadata/properties/metaAttributes"/>
-    <ds:schemaRef ds:uri="http://www.w3.org/2001/XMLSchema"/>
     <ds:schemaRef ds:uri="http://schemas.microsoft.com/office/2006/metadata/properties"/>
-    <ds:schemaRef ds:uri="http://schemas.openxmlformats.org/package/2006/metadata/core-properties"/>
-    <ds:schemaRef ds:uri="http://purl.org/dc/elements/1.1/"/>
-    <ds:schemaRef ds:uri="http://purl.org/dc/terms/"/>
-    <ds:schemaRef ds:uri="http://schemas.microsoft.com/office/internal/2005/internalDocumentation"/>
   </ds:schemaRefs>
 </ds:datastoreItem>
 </file>
@@ -9922,9 +9946,16 @@
 </file>
 
 <file path=customXml/itemProps3.xml><?xml version="1.0" encoding="utf-8"?>
-<ds:datastoreItem xmlns:ds="http://schemas.openxmlformats.org/officeDocument/2006/customXml" ds:itemID="{AEBD4C7A-EE81-430E-8E48-8F597B2AAF83}">
+<ds:datastoreItem xmlns:ds="http://schemas.openxmlformats.org/officeDocument/2006/customXml" ds:itemID="{7E1D9E91-416C-4888-A8AA-BE42FEF97FEF}">
   <ds:schemaRefs>
+    <ds:schemaRef ds:uri="http://schemas.microsoft.com/office/2006/metadata/contentType"/>
+    <ds:schemaRef ds:uri="http://schemas.microsoft.com/office/2006/metadata/properties/metaAttributes"/>
+    <ds:schemaRef ds:uri="http://www.w3.org/2001/XMLSchema"/>
     <ds:schemaRef ds:uri="http://schemas.microsoft.com/office/2006/metadata/properties"/>
+    <ds:schemaRef ds:uri="http://schemas.openxmlformats.org/package/2006/metadata/core-properties"/>
+    <ds:schemaRef ds:uri="http://purl.org/dc/elements/1.1/"/>
+    <ds:schemaRef ds:uri="http://purl.org/dc/terms/"/>
+    <ds:schemaRef ds:uri="http://schemas.microsoft.com/office/internal/2005/internalDocumentation"/>
   </ds:schemaRefs>
 </ds:datastoreItem>
 </file>
</xml_diff>

<commit_message>
Cleanup slides and add resources section
</commit_message>
<xml_diff>
--- a/WhatsNewInWindows81/WhatsNewInWindows81.pptx
+++ b/WhatsNewInWindows81/WhatsNewInWindows81.pptx
@@ -5,10 +5,10 @@
     <p:sldMasterId id="2147483648" r:id="rId4"/>
   </p:sldMasterIdLst>
   <p:notesMasterIdLst>
-    <p:notesMasterId r:id="rId20"/>
+    <p:notesMasterId r:id="rId21"/>
   </p:notesMasterIdLst>
   <p:handoutMasterIdLst>
-    <p:handoutMasterId r:id="rId21"/>
+    <p:handoutMasterId r:id="rId22"/>
   </p:handoutMasterIdLst>
   <p:sldIdLst>
     <p:sldId id="256" r:id="rId5"/>
@@ -24,8 +24,9 @@
     <p:sldId id="265" r:id="rId15"/>
     <p:sldId id="270" r:id="rId16"/>
     <p:sldId id="271" r:id="rId17"/>
-    <p:sldId id="272" r:id="rId18"/>
-    <p:sldId id="257" r:id="rId19"/>
+    <p:sldId id="274" r:id="rId18"/>
+    <p:sldId id="272" r:id="rId19"/>
+    <p:sldId id="257" r:id="rId20"/>
   </p:sldIdLst>
   <p:sldSz cx="9144000" cy="6858000" type="screen4x3"/>
   <p:notesSz cx="7099300" cy="10234613"/>
@@ -746,6 +747,15 @@
           <a:p>
             <a:r>
               <a:rPr lang="en-NZ" dirty="0" smtClean="0"/>
+              <a:t>Demo Search</a:t>
+            </a:r>
+          </a:p>
+          <a:p>
+            <a:endParaRPr lang="en-NZ" dirty="0" smtClean="0"/>
+          </a:p>
+          <a:p>
+            <a:r>
+              <a:rPr lang="en-NZ" dirty="0" smtClean="0"/>
               <a:t>Search</a:t>
             </a:r>
             <a:r>
@@ -850,6 +860,67 @@
     </p:spTree>
     <p:extLst>
       <p:ext uri="{BB962C8B-B14F-4D97-AF65-F5344CB8AC3E}">
+        <p14:creationId xmlns:p14="http://schemas.microsoft.com/office/powerpoint/2010/main" val="4019793681"/>
+      </p:ext>
+    </p:extLst>
+  </p:cSld>
+  <p:clrMapOvr>
+    <a:masterClrMapping/>
+  </p:clrMapOvr>
+</p:notes>
+</file>
+
+<file path=ppt/notesSlides/notesSlide11.xml><?xml version="1.0" encoding="utf-8"?>
+<p:notes xmlns:a="http://schemas.openxmlformats.org/drawingml/2006/main" xmlns:r="http://schemas.openxmlformats.org/officeDocument/2006/relationships" xmlns:p="http://schemas.openxmlformats.org/presentationml/2006/main">
+  <p:cSld>
+    <p:spTree>
+      <p:nvGrpSpPr>
+        <p:cNvPr id="1" name=""/>
+        <p:cNvGrpSpPr/>
+        <p:nvPr/>
+      </p:nvGrpSpPr>
+      <p:grpSpPr>
+        <a:xfrm>
+          <a:off x="0" y="0"/>
+          <a:ext cx="0" cy="0"/>
+          <a:chOff x="0" y="0"/>
+          <a:chExt cx="0" cy="0"/>
+        </a:xfrm>
+      </p:grpSpPr>
+      <p:sp>
+        <p:nvSpPr>
+          <p:cNvPr id="2" name="Slide Image Placeholder 1"/>
+          <p:cNvSpPr>
+            <a:spLocks noGrp="1" noRot="1" noChangeAspect="1"/>
+          </p:cNvSpPr>
+          <p:nvPr>
+            <p:ph type="sldImg"/>
+          </p:nvPr>
+        </p:nvSpPr>
+        <p:spPr/>
+      </p:sp>
+      <p:sp>
+        <p:nvSpPr>
+          <p:cNvPr id="3" name="Notes Placeholder 2"/>
+          <p:cNvSpPr>
+            <a:spLocks noGrp="1"/>
+          </p:cNvSpPr>
+          <p:nvPr>
+            <p:ph type="body" idx="1"/>
+          </p:nvPr>
+        </p:nvSpPr>
+        <p:spPr/>
+        <p:txBody>
+          <a:bodyPr/>
+          <a:lstStyle/>
+          <a:p>
+            <a:endParaRPr lang="en-NZ" dirty="0"/>
+          </a:p>
+        </p:txBody>
+      </p:sp>
+    </p:spTree>
+    <p:extLst>
+      <p:ext uri="{BB962C8B-B14F-4D97-AF65-F5344CB8AC3E}">
         <p14:creationId xmlns:p14="http://schemas.microsoft.com/office/powerpoint/2010/main" val="1316598222"/>
       </p:ext>
     </p:extLst>
@@ -860,7 +931,7 @@
 </p:notes>
 </file>
 
-<file path=ppt/notesSlides/notesSlide11.xml><?xml version="1.0" encoding="utf-8"?>
+<file path=ppt/notesSlides/notesSlide12.xml><?xml version="1.0" encoding="utf-8"?>
 <p:notes xmlns:a="http://schemas.openxmlformats.org/drawingml/2006/main" xmlns:r="http://schemas.openxmlformats.org/officeDocument/2006/relationships" xmlns:p="http://schemas.openxmlformats.org/presentationml/2006/main">
   <p:cSld>
     <p:spTree>
@@ -6216,6 +6287,511 @@
                 <a:latin typeface="Segoe UI Semilight" panose="020B0402040204020203" pitchFamily="34" charset="0"/>
                 <a:cs typeface="Segoe UI Semilight" panose="020B0402040204020203" pitchFamily="34" charset="0"/>
               </a:rPr>
+              <a:t>RESOURCES</a:t>
+            </a:r>
+            <a:endParaRPr lang="en-NZ" sz="1600" dirty="0">
+              <a:solidFill>
+                <a:schemeClr val="tx1">
+                  <a:lumMod val="50000"/>
+                  <a:lumOff val="50000"/>
+                </a:schemeClr>
+              </a:solidFill>
+              <a:latin typeface="Segoe UI Semilight" panose="020B0402040204020203" pitchFamily="34" charset="0"/>
+              <a:cs typeface="Segoe UI Semilight" panose="020B0402040204020203" pitchFamily="34" charset="0"/>
+            </a:endParaRPr>
+          </a:p>
+        </p:txBody>
+      </p:sp>
+      <p:sp>
+        <p:nvSpPr>
+          <p:cNvPr id="5" name="TextBox 4"/>
+          <p:cNvSpPr txBox="1"/>
+          <p:nvPr/>
+        </p:nvSpPr>
+        <p:spPr>
+          <a:xfrm>
+            <a:off x="612512" y="1771471"/>
+            <a:ext cx="6399252" cy="4031873"/>
+          </a:xfrm>
+          <a:prstGeom prst="rect">
+            <a:avLst/>
+          </a:prstGeom>
+          <a:noFill/>
+        </p:spPr>
+        <p:txBody>
+          <a:bodyPr wrap="none" rtlCol="0">
+            <a:spAutoFit/>
+          </a:bodyPr>
+          <a:lstStyle/>
+          <a:p>
+            <a:pPr marL="285750" indent="-285750">
+              <a:buFont typeface="Arial" panose="020B0604020202020204" pitchFamily="34" charset="0"/>
+              <a:buChar char="•"/>
+            </a:pPr>
+            <a:r>
+              <a:rPr lang="en-NZ" sz="2400" dirty="0" smtClean="0">
+                <a:solidFill>
+                  <a:srgbClr val="3A537B"/>
+                </a:solidFill>
+                <a:latin typeface="Segoe UI Semilight" panose="020B0402040204020203" pitchFamily="34" charset="0"/>
+                <a:cs typeface="Segoe UI Semilight" panose="020B0402040204020203" pitchFamily="34" charset="0"/>
+              </a:rPr>
+              <a:t>MSDN </a:t>
+            </a:r>
+          </a:p>
+          <a:p>
+            <a:pPr marL="742950" lvl="1" indent="-285750">
+              <a:buFont typeface="Arial" panose="020B0604020202020204" pitchFamily="34" charset="0"/>
+              <a:buChar char="•"/>
+            </a:pPr>
+            <a:r>
+              <a:rPr lang="en-NZ" sz="2000" dirty="0" smtClean="0">
+                <a:solidFill>
+                  <a:srgbClr val="3A537B"/>
+                </a:solidFill>
+                <a:latin typeface="Segoe UI Semilight" panose="020B0402040204020203" pitchFamily="34" charset="0"/>
+                <a:cs typeface="Segoe UI Semilight" panose="020B0402040204020203" pitchFamily="34" charset="0"/>
+              </a:rPr>
+              <a:t>code.msdn.microsoft.com (Filter to VS 2013)</a:t>
+            </a:r>
+          </a:p>
+          <a:p>
+            <a:pPr marL="742950" lvl="1" indent="-285750">
+              <a:buFont typeface="Arial" panose="020B0604020202020204" pitchFamily="34" charset="0"/>
+              <a:buChar char="•"/>
+            </a:pPr>
+            <a:r>
+              <a:rPr lang="en-NZ" sz="2000" dirty="0" smtClean="0">
+                <a:solidFill>
+                  <a:srgbClr val="3A537B"/>
+                </a:solidFill>
+                <a:latin typeface="Segoe UI Semilight" panose="020B0402040204020203" pitchFamily="34" charset="0"/>
+                <a:cs typeface="Segoe UI Semilight" panose="020B0402040204020203" pitchFamily="34" charset="0"/>
+                <a:hlinkClick r:id="rId4"/>
+              </a:rPr>
+              <a:t>HTML and </a:t>
+            </a:r>
+            <a:r>
+              <a:rPr lang="en-NZ" sz="2000" dirty="0" err="1" smtClean="0">
+                <a:solidFill>
+                  <a:srgbClr val="3A537B"/>
+                </a:solidFill>
+                <a:latin typeface="Segoe UI Semilight" panose="020B0402040204020203" pitchFamily="34" charset="0"/>
+                <a:cs typeface="Segoe UI Semilight" panose="020B0402040204020203" pitchFamily="34" charset="0"/>
+                <a:hlinkClick r:id="rId4"/>
+              </a:rPr>
+              <a:t>Javascript</a:t>
+            </a:r>
+            <a:r>
+              <a:rPr lang="en-NZ" sz="2000" dirty="0" smtClean="0">
+                <a:solidFill>
+                  <a:srgbClr val="3A537B"/>
+                </a:solidFill>
+                <a:latin typeface="Segoe UI Semilight" panose="020B0402040204020203" pitchFamily="34" charset="0"/>
+                <a:cs typeface="Segoe UI Semilight" panose="020B0402040204020203" pitchFamily="34" charset="0"/>
+                <a:hlinkClick r:id="rId4"/>
+              </a:rPr>
+              <a:t> Controls</a:t>
+            </a:r>
+            <a:endParaRPr lang="en-NZ" sz="2000" dirty="0" smtClean="0">
+              <a:solidFill>
+                <a:srgbClr val="3A537B"/>
+              </a:solidFill>
+              <a:latin typeface="Segoe UI Semilight" panose="020B0402040204020203" pitchFamily="34" charset="0"/>
+              <a:cs typeface="Segoe UI Semilight" panose="020B0402040204020203" pitchFamily="34" charset="0"/>
+            </a:endParaRPr>
+          </a:p>
+          <a:p>
+            <a:pPr marL="742950" lvl="1" indent="-285750">
+              <a:buFont typeface="Arial" panose="020B0604020202020204" pitchFamily="34" charset="0"/>
+              <a:buChar char="•"/>
+            </a:pPr>
+            <a:r>
+              <a:rPr lang="en-NZ" sz="2000" dirty="0" smtClean="0">
+                <a:solidFill>
+                  <a:srgbClr val="3A537B"/>
+                </a:solidFill>
+                <a:latin typeface="Segoe UI Semilight" panose="020B0402040204020203" pitchFamily="34" charset="0"/>
+                <a:cs typeface="Segoe UI Semilight" panose="020B0402040204020203" pitchFamily="34" charset="0"/>
+                <a:hlinkClick r:id="rId5"/>
+              </a:rPr>
+              <a:t>Product Guide for Developers</a:t>
+            </a:r>
+            <a:endParaRPr lang="en-NZ" sz="2000" dirty="0" smtClean="0">
+              <a:solidFill>
+                <a:srgbClr val="3A537B"/>
+              </a:solidFill>
+              <a:latin typeface="Segoe UI Semilight" panose="020B0402040204020203" pitchFamily="34" charset="0"/>
+              <a:cs typeface="Segoe UI Semilight" panose="020B0402040204020203" pitchFamily="34" charset="0"/>
+            </a:endParaRPr>
+          </a:p>
+          <a:p>
+            <a:pPr marL="742950" lvl="1" indent="-285750">
+              <a:buFont typeface="Arial" panose="020B0604020202020204" pitchFamily="34" charset="0"/>
+              <a:buChar char="•"/>
+            </a:pPr>
+            <a:r>
+              <a:rPr lang="en-NZ" sz="2000" dirty="0" smtClean="0">
+                <a:solidFill>
+                  <a:srgbClr val="3A537B"/>
+                </a:solidFill>
+                <a:latin typeface="Segoe UI Semilight" panose="020B0402040204020203" pitchFamily="34" charset="0"/>
+                <a:cs typeface="Segoe UI Semilight" panose="020B0402040204020203" pitchFamily="34" charset="0"/>
+                <a:hlinkClick r:id="rId6"/>
+              </a:rPr>
+              <a:t>Windows 8.1 New APIs and features for </a:t>
+            </a:r>
+            <a:r>
+              <a:rPr lang="en-NZ" sz="2000" dirty="0" err="1" smtClean="0">
+                <a:solidFill>
+                  <a:srgbClr val="3A537B"/>
+                </a:solidFill>
+                <a:latin typeface="Segoe UI Semilight" panose="020B0402040204020203" pitchFamily="34" charset="0"/>
+                <a:cs typeface="Segoe UI Semilight" panose="020B0402040204020203" pitchFamily="34" charset="0"/>
+                <a:hlinkClick r:id="rId6"/>
+              </a:rPr>
+              <a:t>devs</a:t>
+            </a:r>
+            <a:endParaRPr lang="en-NZ" sz="2000" dirty="0" smtClean="0">
+              <a:solidFill>
+                <a:srgbClr val="3A537B"/>
+              </a:solidFill>
+              <a:latin typeface="Segoe UI Semilight" panose="020B0402040204020203" pitchFamily="34" charset="0"/>
+              <a:cs typeface="Segoe UI Semilight" panose="020B0402040204020203" pitchFamily="34" charset="0"/>
+            </a:endParaRPr>
+          </a:p>
+          <a:p>
+            <a:pPr marL="285750" indent="-285750">
+              <a:buFont typeface="Arial" panose="020B0604020202020204" pitchFamily="34" charset="0"/>
+              <a:buChar char="•"/>
+            </a:pPr>
+            <a:endParaRPr lang="en-NZ" sz="2000" dirty="0">
+              <a:solidFill>
+                <a:srgbClr val="3A537B"/>
+              </a:solidFill>
+              <a:latin typeface="Segoe UI Semilight" panose="020B0402040204020203" pitchFamily="34" charset="0"/>
+              <a:cs typeface="Segoe UI Semilight" panose="020B0402040204020203" pitchFamily="34" charset="0"/>
+            </a:endParaRPr>
+          </a:p>
+          <a:p>
+            <a:pPr marL="285750" indent="-285750">
+              <a:buFont typeface="Arial" panose="020B0604020202020204" pitchFamily="34" charset="0"/>
+              <a:buChar char="•"/>
+            </a:pPr>
+            <a:r>
+              <a:rPr lang="en-NZ" sz="2400" dirty="0" err="1" smtClean="0">
+                <a:solidFill>
+                  <a:srgbClr val="3A537B"/>
+                </a:solidFill>
+                <a:latin typeface="Segoe UI Semilight" panose="020B0402040204020203" pitchFamily="34" charset="0"/>
+                <a:cs typeface="Segoe UI Semilight" panose="020B0402040204020203" pitchFamily="34" charset="0"/>
+              </a:rPr>
+              <a:t>Wintellect</a:t>
+            </a:r>
+            <a:r>
+              <a:rPr lang="en-NZ" sz="2400" dirty="0" err="1" smtClean="0">
+                <a:solidFill>
+                  <a:srgbClr val="3A537B"/>
+                </a:solidFill>
+                <a:latin typeface="Segoe UI Semilight" panose="020B0402040204020203" pitchFamily="34" charset="0"/>
+                <a:cs typeface="Segoe UI Semilight" panose="020B0402040204020203" pitchFamily="34" charset="0"/>
+              </a:rPr>
+              <a:t>’s</a:t>
+            </a:r>
+            <a:r>
+              <a:rPr lang="en-NZ" sz="2400" dirty="0" smtClean="0">
+                <a:solidFill>
+                  <a:srgbClr val="3A537B"/>
+                </a:solidFill>
+                <a:latin typeface="Segoe UI Semilight" panose="020B0402040204020203" pitchFamily="34" charset="0"/>
+                <a:cs typeface="Segoe UI Semilight" panose="020B0402040204020203" pitchFamily="34" charset="0"/>
+              </a:rPr>
+              <a:t> Jeff </a:t>
+            </a:r>
+            <a:r>
+              <a:rPr lang="en-NZ" sz="2400" dirty="0" err="1" smtClean="0">
+                <a:solidFill>
+                  <a:srgbClr val="3A537B"/>
+                </a:solidFill>
+                <a:latin typeface="Segoe UI Semilight" panose="020B0402040204020203" pitchFamily="34" charset="0"/>
+                <a:cs typeface="Segoe UI Semilight" panose="020B0402040204020203" pitchFamily="34" charset="0"/>
+              </a:rPr>
+              <a:t>Prosise</a:t>
+            </a:r>
+            <a:r>
+              <a:rPr lang="en-NZ" sz="2400" dirty="0" smtClean="0">
+                <a:solidFill>
+                  <a:srgbClr val="3A537B"/>
+                </a:solidFill>
+                <a:latin typeface="Segoe UI Semilight" panose="020B0402040204020203" pitchFamily="34" charset="0"/>
+                <a:cs typeface="Segoe UI Semilight" panose="020B0402040204020203" pitchFamily="34" charset="0"/>
+              </a:rPr>
+              <a:t> </a:t>
+            </a:r>
+            <a:r>
+              <a:rPr lang="en-NZ" sz="2400" dirty="0" smtClean="0">
+                <a:solidFill>
+                  <a:srgbClr val="3A537B"/>
+                </a:solidFill>
+                <a:latin typeface="Segoe UI Semilight" panose="020B0402040204020203" pitchFamily="34" charset="0"/>
+                <a:cs typeface="Segoe UI Semilight" panose="020B0402040204020203" pitchFamily="34" charset="0"/>
+                <a:hlinkClick r:id="rId7"/>
+              </a:rPr>
+              <a:t>blog post</a:t>
+            </a:r>
+            <a:endParaRPr lang="en-NZ" sz="2400" dirty="0" smtClean="0">
+              <a:solidFill>
+                <a:srgbClr val="3A537B"/>
+              </a:solidFill>
+              <a:latin typeface="Segoe UI Semilight" panose="020B0402040204020203" pitchFamily="34" charset="0"/>
+              <a:cs typeface="Segoe UI Semilight" panose="020B0402040204020203" pitchFamily="34" charset="0"/>
+            </a:endParaRPr>
+          </a:p>
+          <a:p>
+            <a:pPr marL="742950" lvl="1" indent="-285750">
+              <a:buFont typeface="Arial" panose="020B0604020202020204" pitchFamily="34" charset="0"/>
+              <a:buChar char="•"/>
+            </a:pPr>
+            <a:endParaRPr lang="en-NZ" sz="2400" dirty="0" smtClean="0">
+              <a:solidFill>
+                <a:srgbClr val="3A537B"/>
+              </a:solidFill>
+              <a:latin typeface="Segoe UI Semilight" panose="020B0402040204020203" pitchFamily="34" charset="0"/>
+              <a:cs typeface="Segoe UI Semilight" panose="020B0402040204020203" pitchFamily="34" charset="0"/>
+            </a:endParaRPr>
+          </a:p>
+          <a:p>
+            <a:pPr marL="285750" indent="-285750">
+              <a:buFont typeface="Arial" panose="020B0604020202020204" pitchFamily="34" charset="0"/>
+              <a:buChar char="•"/>
+            </a:pPr>
+            <a:r>
+              <a:rPr lang="en-NZ" sz="2400" dirty="0" smtClean="0">
+                <a:solidFill>
+                  <a:srgbClr val="3A537B"/>
+                </a:solidFill>
+                <a:latin typeface="Segoe UI Semilight" panose="020B0402040204020203" pitchFamily="34" charset="0"/>
+                <a:cs typeface="Segoe UI Semilight" panose="020B0402040204020203" pitchFamily="34" charset="0"/>
+              </a:rPr>
+              <a:t>Build</a:t>
+            </a:r>
+          </a:p>
+          <a:p>
+            <a:pPr marL="742950" lvl="1" indent="-285750">
+              <a:buFont typeface="Arial" panose="020B0604020202020204" pitchFamily="34" charset="0"/>
+              <a:buChar char="•"/>
+            </a:pPr>
+            <a:r>
+              <a:rPr lang="en-NZ" sz="2000" dirty="0" smtClean="0">
+                <a:solidFill>
+                  <a:srgbClr val="3A537B"/>
+                </a:solidFill>
+                <a:latin typeface="Segoe UI Semilight" panose="020B0402040204020203" pitchFamily="34" charset="0"/>
+                <a:cs typeface="Segoe UI Semilight" panose="020B0402040204020203" pitchFamily="34" charset="0"/>
+              </a:rPr>
+              <a:t>Tim </a:t>
+            </a:r>
+            <a:r>
+              <a:rPr lang="en-NZ" sz="2000" dirty="0" err="1" smtClean="0">
+                <a:solidFill>
+                  <a:srgbClr val="3A537B"/>
+                </a:solidFill>
+                <a:latin typeface="Segoe UI Semilight" panose="020B0402040204020203" pitchFamily="34" charset="0"/>
+                <a:cs typeface="Segoe UI Semilight" panose="020B0402040204020203" pitchFamily="34" charset="0"/>
+              </a:rPr>
+              <a:t>Heuer’s</a:t>
+            </a:r>
+            <a:r>
+              <a:rPr lang="en-NZ" sz="2000" dirty="0" smtClean="0">
+                <a:solidFill>
+                  <a:srgbClr val="3A537B"/>
+                </a:solidFill>
+                <a:latin typeface="Segoe UI Semilight" panose="020B0402040204020203" pitchFamily="34" charset="0"/>
+                <a:cs typeface="Segoe UI Semilight" panose="020B0402040204020203" pitchFamily="34" charset="0"/>
+              </a:rPr>
+              <a:t> </a:t>
+            </a:r>
+            <a:r>
+              <a:rPr lang="en-NZ" sz="2000" dirty="0" smtClean="0">
+                <a:solidFill>
+                  <a:srgbClr val="3A537B"/>
+                </a:solidFill>
+                <a:latin typeface="Segoe UI Semilight" panose="020B0402040204020203" pitchFamily="34" charset="0"/>
+                <a:cs typeface="Segoe UI Semilight" panose="020B0402040204020203" pitchFamily="34" charset="0"/>
+                <a:hlinkClick r:id="rId8"/>
+              </a:rPr>
+              <a:t>Build Talk</a:t>
+            </a:r>
+            <a:endParaRPr lang="en-NZ" sz="2000" dirty="0" smtClean="0">
+              <a:solidFill>
+                <a:srgbClr val="3A537B"/>
+              </a:solidFill>
+              <a:latin typeface="Segoe UI Semilight" panose="020B0402040204020203" pitchFamily="34" charset="0"/>
+              <a:cs typeface="Segoe UI Semilight" panose="020B0402040204020203" pitchFamily="34" charset="0"/>
+            </a:endParaRPr>
+          </a:p>
+          <a:p>
+            <a:pPr marL="742950" lvl="1" indent="-285750">
+              <a:buFont typeface="Arial" panose="020B0604020202020204" pitchFamily="34" charset="0"/>
+              <a:buChar char="•"/>
+            </a:pPr>
+            <a:r>
+              <a:rPr lang="en-NZ" sz="2000" dirty="0" smtClean="0">
+                <a:solidFill>
+                  <a:srgbClr val="3A537B"/>
+                </a:solidFill>
+                <a:latin typeface="Segoe UI Semilight" panose="020B0402040204020203" pitchFamily="34" charset="0"/>
+                <a:cs typeface="Segoe UI Semilight" panose="020B0402040204020203" pitchFamily="34" charset="0"/>
+                <a:hlinkClick r:id="rId9"/>
+              </a:rPr>
+              <a:t>What’s New in VS &amp; Blend for XAML </a:t>
+            </a:r>
+            <a:r>
+              <a:rPr lang="en-NZ" sz="2000" dirty="0" err="1" smtClean="0">
+                <a:solidFill>
+                  <a:srgbClr val="3A537B"/>
+                </a:solidFill>
+                <a:latin typeface="Segoe UI Semilight" panose="020B0402040204020203" pitchFamily="34" charset="0"/>
+                <a:cs typeface="Segoe UI Semilight" panose="020B0402040204020203" pitchFamily="34" charset="0"/>
+                <a:hlinkClick r:id="rId9"/>
+              </a:rPr>
+              <a:t>devs</a:t>
+            </a:r>
+            <a:endParaRPr lang="en-NZ" sz="2000" dirty="0" smtClean="0">
+              <a:solidFill>
+                <a:srgbClr val="3A537B"/>
+              </a:solidFill>
+              <a:latin typeface="Segoe UI Semilight" panose="020B0402040204020203" pitchFamily="34" charset="0"/>
+              <a:cs typeface="Segoe UI Semilight" panose="020B0402040204020203" pitchFamily="34" charset="0"/>
+            </a:endParaRPr>
+          </a:p>
+          <a:p>
+            <a:pPr marL="742950" lvl="1" indent="-285750">
+              <a:buFont typeface="Arial" panose="020B0604020202020204" pitchFamily="34" charset="0"/>
+              <a:buChar char="•"/>
+            </a:pPr>
+            <a:r>
+              <a:rPr lang="en-NZ" sz="2000" dirty="0">
+                <a:solidFill>
+                  <a:srgbClr val="3A537B"/>
+                </a:solidFill>
+                <a:latin typeface="Segoe UI Semilight" panose="020B0402040204020203" pitchFamily="34" charset="0"/>
+                <a:cs typeface="Segoe UI Semilight" panose="020B0402040204020203" pitchFamily="34" charset="0"/>
+                <a:hlinkClick r:id="rId10"/>
+              </a:rPr>
+              <a:t>What's New in Windows Runtime for Windows 8.1</a:t>
+            </a:r>
+            <a:endParaRPr lang="en-NZ" sz="2000" dirty="0" smtClean="0">
+              <a:solidFill>
+                <a:srgbClr val="3A537B"/>
+              </a:solidFill>
+              <a:latin typeface="Segoe UI Semilight" panose="020B0402040204020203" pitchFamily="34" charset="0"/>
+              <a:cs typeface="Segoe UI Semilight" panose="020B0402040204020203" pitchFamily="34" charset="0"/>
+            </a:endParaRPr>
+          </a:p>
+        </p:txBody>
+      </p:sp>
+    </p:spTree>
+    <p:extLst>
+      <p:ext uri="{BB962C8B-B14F-4D97-AF65-F5344CB8AC3E}">
+        <p14:creationId xmlns:p14="http://schemas.microsoft.com/office/powerpoint/2010/main" val="180638312"/>
+      </p:ext>
+    </p:extLst>
+  </p:cSld>
+  <p:clrMapOvr>
+    <a:masterClrMapping/>
+  </p:clrMapOvr>
+  <p:timing>
+    <p:tnLst>
+      <p:par>
+        <p:cTn id="1" dur="indefinite" restart="never" nodeType="tmRoot"/>
+      </p:par>
+    </p:tnLst>
+  </p:timing>
+</p:sld>
+</file>
+
+<file path=ppt/slides/slide15.xml><?xml version="1.0" encoding="utf-8"?>
+<p:sld xmlns:a="http://schemas.openxmlformats.org/drawingml/2006/main" xmlns:r="http://schemas.openxmlformats.org/officeDocument/2006/relationships" xmlns:p="http://schemas.openxmlformats.org/presentationml/2006/main">
+  <p:cSld>
+    <p:spTree>
+      <p:nvGrpSpPr>
+        <p:cNvPr id="1" name=""/>
+        <p:cNvGrpSpPr/>
+        <p:nvPr/>
+      </p:nvGrpSpPr>
+      <p:grpSpPr>
+        <a:xfrm>
+          <a:off x="0" y="0"/>
+          <a:ext cx="0" cy="0"/>
+          <a:chOff x="0" y="0"/>
+          <a:chExt cx="0" cy="0"/>
+        </a:xfrm>
+      </p:grpSpPr>
+      <p:pic>
+        <p:nvPicPr>
+          <p:cNvPr id="6" name="Picture 5"/>
+          <p:cNvPicPr>
+            <a:picLocks noChangeAspect="1"/>
+          </p:cNvPicPr>
+          <p:nvPr/>
+        </p:nvPicPr>
+        <p:blipFill>
+          <a:blip r:embed="rId3">
+            <a:extLst>
+              <a:ext uri="{28A0092B-C50C-407E-A947-70E740481C1C}">
+                <a14:useLocalDpi xmlns:a14="http://schemas.microsoft.com/office/drawing/2010/main" val="0"/>
+              </a:ext>
+            </a:extLst>
+          </a:blip>
+          <a:stretch>
+            <a:fillRect/>
+          </a:stretch>
+        </p:blipFill>
+        <p:spPr>
+          <a:xfrm>
+            <a:off x="0" y="0"/>
+            <a:ext cx="9144000" cy="6858000"/>
+          </a:xfrm>
+          <a:prstGeom prst="rect">
+            <a:avLst/>
+          </a:prstGeom>
+        </p:spPr>
+      </p:pic>
+      <p:sp>
+        <p:nvSpPr>
+          <p:cNvPr id="3" name="TextBox 2"/>
+          <p:cNvSpPr txBox="1"/>
+          <p:nvPr/>
+        </p:nvSpPr>
+        <p:spPr>
+          <a:xfrm>
+            <a:off x="3200400" y="533400"/>
+            <a:ext cx="5410200" cy="338554"/>
+          </a:xfrm>
+          <a:prstGeom prst="rect">
+            <a:avLst/>
+          </a:prstGeom>
+          <a:noFill/>
+        </p:spPr>
+        <p:txBody>
+          <a:bodyPr wrap="square" rtlCol="0">
+            <a:spAutoFit/>
+          </a:bodyPr>
+          <a:lstStyle/>
+          <a:p>
+            <a:pPr algn="r"/>
+            <a:r>
+              <a:rPr lang="en-NZ" sz="1600" dirty="0" smtClean="0">
+                <a:solidFill>
+                  <a:schemeClr val="tx1">
+                    <a:lumMod val="50000"/>
+                    <a:lumOff val="50000"/>
+                  </a:schemeClr>
+                </a:solidFill>
+                <a:latin typeface="Segoe UI Semilight" panose="020B0402040204020203" pitchFamily="34" charset="0"/>
+                <a:cs typeface="Segoe UI Semilight" panose="020B0402040204020203" pitchFamily="34" charset="0"/>
+              </a:rPr>
               <a:t>WHAT’S NEW FOR CONSUMERS</a:t>
             </a:r>
             <a:endParaRPr lang="en-NZ" sz="1600" dirty="0">
@@ -6293,7 +6869,7 @@
 </p:sld>
 </file>
 
-<file path=ppt/slides/slide15.xml><?xml version="1.0" encoding="utf-8"?>
+<file path=ppt/slides/slide16.xml><?xml version="1.0" encoding="utf-8"?>
 <p:sld xmlns:a="http://schemas.openxmlformats.org/drawingml/2006/main" xmlns:r="http://schemas.openxmlformats.org/officeDocument/2006/relationships" xmlns:p="http://schemas.openxmlformats.org/presentationml/2006/main">
   <p:cSld>
     <p:spTree>
@@ -6628,8 +7204,8 @@
         </p:nvSpPr>
         <p:spPr>
           <a:xfrm>
-            <a:off x="3333108" y="1995241"/>
-            <a:ext cx="2034083" cy="923330"/>
+            <a:off x="3200400" y="1856741"/>
+            <a:ext cx="2641942" cy="1200329"/>
           </a:xfrm>
           <a:prstGeom prst="rect">
             <a:avLst/>
@@ -6643,7 +7219,7 @@
           <a:lstStyle/>
           <a:p>
             <a:r>
-              <a:rPr lang="en-NZ" dirty="0" smtClean="0">
+              <a:rPr lang="en-NZ" sz="2400" dirty="0" smtClean="0">
                 <a:solidFill>
                   <a:srgbClr val="3A537B"/>
                 </a:solidFill>
@@ -6653,7 +7229,7 @@
               <a:t>@</a:t>
             </a:r>
             <a:r>
-              <a:rPr lang="en-NZ" dirty="0" err="1" smtClean="0">
+              <a:rPr lang="en-NZ" sz="2400" dirty="0" err="1" smtClean="0">
                 <a:solidFill>
                   <a:srgbClr val="3A537B"/>
                 </a:solidFill>
@@ -6663,7 +7239,7 @@
               <a:t>petegoo</a:t>
             </a:r>
             <a:r>
-              <a:rPr lang="en-NZ" dirty="0" smtClean="0">
+              <a:rPr lang="en-NZ" sz="2400" dirty="0" smtClean="0">
                 <a:solidFill>
                   <a:srgbClr val="3A537B"/>
                 </a:solidFill>
@@ -6673,7 +7249,7 @@
               <a:t/>
             </a:r>
             <a:br>
-              <a:rPr lang="en-NZ" dirty="0" smtClean="0">
+              <a:rPr lang="en-NZ" sz="2400" dirty="0" smtClean="0">
                 <a:solidFill>
                   <a:srgbClr val="3A537B"/>
                 </a:solidFill>
@@ -6681,7 +7257,7 @@
                 <a:cs typeface="Segoe UI Semilight" panose="020B0402040204020203" pitchFamily="34" charset="0"/>
               </a:rPr>
             </a:br>
-            <a:endParaRPr lang="en-NZ" dirty="0" smtClean="0">
+            <a:endParaRPr lang="en-NZ" sz="2400" dirty="0" smtClean="0">
               <a:solidFill>
                 <a:srgbClr val="3A537B"/>
               </a:solidFill>
@@ -6691,7 +7267,7 @@
           </a:p>
           <a:p>
             <a:r>
-              <a:rPr lang="en-NZ" dirty="0" smtClean="0">
+              <a:rPr lang="en-NZ" sz="2400" dirty="0" smtClean="0">
                 <a:solidFill>
                   <a:srgbClr val="3A537B"/>
                 </a:solidFill>
@@ -6700,7 +7276,7 @@
               </a:rPr>
               <a:t>www.petegoo.com</a:t>
             </a:r>
-            <a:endParaRPr lang="en-US" dirty="0">
+            <a:endParaRPr lang="en-US" sz="2400" dirty="0">
               <a:solidFill>
                 <a:srgbClr val="3A537B"/>
               </a:solidFill>
@@ -6763,7 +7339,7 @@
         </p:nvSpPr>
         <p:spPr>
           <a:xfrm>
-            <a:off x="3200400" y="4313646"/>
+            <a:off x="3203388" y="4313646"/>
             <a:ext cx="2737224" cy="1200329"/>
           </a:xfrm>
           <a:prstGeom prst="rect">
@@ -7268,7 +7844,7 @@
         <p:spPr>
           <a:xfrm>
             <a:off x="609600" y="1524000"/>
-            <a:ext cx="6651949" cy="6740307"/>
+            <a:ext cx="5693995" cy="6124754"/>
           </a:xfrm>
           <a:prstGeom prst="rect">
             <a:avLst/>
@@ -7293,14 +7869,173 @@
                 <a:latin typeface="Segoe UI Semilight" panose="020B0402040204020203" pitchFamily="34" charset="0"/>
                 <a:cs typeface="Segoe UI Semilight" panose="020B0402040204020203" pitchFamily="34" charset="0"/>
               </a:rPr>
-              <a:t>Start Screen</a:t>
-            </a:r>
+              <a:t>Start </a:t>
+            </a:r>
+            <a:r>
+              <a:rPr lang="en-NZ" sz="2400" dirty="0" smtClean="0">
+                <a:solidFill>
+                  <a:srgbClr val="3A537B"/>
+                </a:solidFill>
+                <a:latin typeface="Segoe UI Semilight" panose="020B0402040204020203" pitchFamily="34" charset="0"/>
+                <a:cs typeface="Segoe UI Semilight" panose="020B0402040204020203" pitchFamily="34" charset="0"/>
+              </a:rPr>
+              <a:t>Screen</a:t>
+            </a:r>
+            <a:endParaRPr lang="en-NZ" sz="2000" dirty="0" smtClean="0">
+              <a:solidFill>
+                <a:srgbClr val="3A537B"/>
+              </a:solidFill>
+              <a:latin typeface="Segoe UI Semilight" panose="020B0402040204020203" pitchFamily="34" charset="0"/>
+              <a:cs typeface="Segoe UI Semilight" panose="020B0402040204020203" pitchFamily="34" charset="0"/>
+            </a:endParaRPr>
+          </a:p>
+          <a:p>
+            <a:pPr marL="742950" lvl="1" indent="-285750">
+              <a:buFont typeface="Arial" panose="020B0604020202020204" pitchFamily="34" charset="0"/>
+              <a:buChar char="•"/>
+            </a:pPr>
+            <a:r>
+              <a:rPr lang="en-NZ" sz="2000" dirty="0" smtClean="0">
+                <a:solidFill>
+                  <a:srgbClr val="3A537B"/>
+                </a:solidFill>
+                <a:latin typeface="Segoe UI Semilight" panose="020B0402040204020203" pitchFamily="34" charset="0"/>
+                <a:cs typeface="Segoe UI Semilight" panose="020B0402040204020203" pitchFamily="34" charset="0"/>
+              </a:rPr>
+              <a:t>Background</a:t>
+            </a:r>
+          </a:p>
+          <a:p>
+            <a:pPr marL="742950" lvl="1" indent="-285750">
+              <a:buFont typeface="Arial" panose="020B0604020202020204" pitchFamily="34" charset="0"/>
+              <a:buChar char="•"/>
+            </a:pPr>
+            <a:r>
+              <a:rPr lang="en-NZ" sz="2000" dirty="0" smtClean="0">
+                <a:solidFill>
+                  <a:srgbClr val="3A537B"/>
+                </a:solidFill>
+                <a:latin typeface="Segoe UI Semilight" panose="020B0402040204020203" pitchFamily="34" charset="0"/>
+                <a:cs typeface="Segoe UI Semilight" panose="020B0402040204020203" pitchFamily="34" charset="0"/>
+              </a:rPr>
+              <a:t>Multi-size tile (Small, Medium, Wide, Large)</a:t>
+            </a:r>
+          </a:p>
+          <a:p>
+            <a:pPr marL="742950" lvl="1" indent="-285750">
+              <a:buFont typeface="Arial" panose="020B0604020202020204" pitchFamily="34" charset="0"/>
+              <a:buChar char="•"/>
+            </a:pPr>
+            <a:r>
+              <a:rPr lang="en-NZ" sz="2000" dirty="0" smtClean="0">
+                <a:solidFill>
+                  <a:srgbClr val="3A537B"/>
+                </a:solidFill>
+                <a:latin typeface="Segoe UI Semilight" panose="020B0402040204020203" pitchFamily="34" charset="0"/>
+                <a:cs typeface="Segoe UI Semilight" panose="020B0402040204020203" pitchFamily="34" charset="0"/>
+              </a:rPr>
+              <a:t>Swipe up for all Apps</a:t>
+            </a:r>
+          </a:p>
+          <a:p>
+            <a:pPr marL="742950" lvl="1" indent="-285750">
+              <a:buFont typeface="Arial" panose="020B0604020202020204" pitchFamily="34" charset="0"/>
+              <a:buChar char="•"/>
+            </a:pPr>
+            <a:r>
+              <a:rPr lang="en-NZ" sz="2000" dirty="0" smtClean="0">
+                <a:solidFill>
+                  <a:srgbClr val="3A537B"/>
+                </a:solidFill>
+                <a:latin typeface="Segoe UI Semilight" panose="020B0402040204020203" pitchFamily="34" charset="0"/>
+                <a:cs typeface="Segoe UI Semilight" panose="020B0402040204020203" pitchFamily="34" charset="0"/>
+              </a:rPr>
+              <a:t>Search Changes</a:t>
+            </a:r>
+          </a:p>
+          <a:p>
+            <a:pPr marL="742950" lvl="1" indent="-285750">
+              <a:buFont typeface="Arial" panose="020B0604020202020204" pitchFamily="34" charset="0"/>
+              <a:buChar char="•"/>
+            </a:pPr>
+            <a:r>
+              <a:rPr lang="en-NZ" sz="2000" dirty="0" smtClean="0">
+                <a:solidFill>
+                  <a:srgbClr val="3A537B"/>
+                </a:solidFill>
+                <a:latin typeface="Segoe UI Semilight" panose="020B0402040204020203" pitchFamily="34" charset="0"/>
+                <a:cs typeface="Segoe UI Semilight" panose="020B0402040204020203" pitchFamily="34" charset="0"/>
+              </a:rPr>
+              <a:t>Sync</a:t>
+            </a:r>
+            <a:br>
+              <a:rPr lang="en-NZ" sz="2000" dirty="0" smtClean="0">
+                <a:solidFill>
+                  <a:srgbClr val="3A537B"/>
+                </a:solidFill>
+                <a:latin typeface="Segoe UI Semilight" panose="020B0402040204020203" pitchFamily="34" charset="0"/>
+                <a:cs typeface="Segoe UI Semilight" panose="020B0402040204020203" pitchFamily="34" charset="0"/>
+              </a:rPr>
+            </a:br>
+            <a:endParaRPr lang="en-NZ" sz="2000" dirty="0" smtClean="0">
+              <a:solidFill>
+                <a:srgbClr val="3A537B"/>
+              </a:solidFill>
+              <a:latin typeface="Segoe UI Semilight" panose="020B0402040204020203" pitchFamily="34" charset="0"/>
+              <a:cs typeface="Segoe UI Semilight" panose="020B0402040204020203" pitchFamily="34" charset="0"/>
+            </a:endParaRPr>
           </a:p>
           <a:p>
             <a:pPr marL="285750" indent="-285750">
               <a:buFont typeface="Arial" panose="020B0604020202020204" pitchFamily="34" charset="0"/>
               <a:buChar char="•"/>
             </a:pPr>
+            <a:r>
+              <a:rPr lang="en-NZ" sz="2400" dirty="0" smtClean="0">
+                <a:solidFill>
+                  <a:srgbClr val="3A537B"/>
+                </a:solidFill>
+                <a:latin typeface="Segoe UI Semilight" panose="020B0402040204020203" pitchFamily="34" charset="0"/>
+                <a:cs typeface="Segoe UI Semilight" panose="020B0402040204020203" pitchFamily="34" charset="0"/>
+              </a:rPr>
+              <a:t>Search</a:t>
+            </a:r>
+            <a:endParaRPr lang="en-NZ" sz="2000" dirty="0" smtClean="0">
+              <a:solidFill>
+                <a:srgbClr val="3A537B"/>
+              </a:solidFill>
+              <a:latin typeface="Segoe UI Semilight" panose="020B0402040204020203" pitchFamily="34" charset="0"/>
+              <a:cs typeface="Segoe UI Semilight" panose="020B0402040204020203" pitchFamily="34" charset="0"/>
+            </a:endParaRPr>
+          </a:p>
+          <a:p>
+            <a:pPr marL="285750" indent="-285750">
+              <a:buFont typeface="Arial" panose="020B0604020202020204" pitchFamily="34" charset="0"/>
+              <a:buChar char="•"/>
+            </a:pPr>
+            <a:endParaRPr lang="en-NZ" sz="2000" dirty="0">
+              <a:solidFill>
+                <a:srgbClr val="3A537B"/>
+              </a:solidFill>
+              <a:latin typeface="Segoe UI Semilight" panose="020B0402040204020203" pitchFamily="34" charset="0"/>
+              <a:cs typeface="Segoe UI Semilight" panose="020B0402040204020203" pitchFamily="34" charset="0"/>
+            </a:endParaRPr>
+          </a:p>
+          <a:p>
+            <a:pPr marL="285750" indent="-285750">
+              <a:buFont typeface="Arial" panose="020B0604020202020204" pitchFamily="34" charset="0"/>
+              <a:buChar char="•"/>
+            </a:pPr>
+            <a:r>
+              <a:rPr lang="en-NZ" sz="2400" dirty="0" smtClean="0">
+                <a:solidFill>
+                  <a:srgbClr val="3A537B"/>
+                </a:solidFill>
+                <a:latin typeface="Segoe UI Semilight" panose="020B0402040204020203" pitchFamily="34" charset="0"/>
+                <a:cs typeface="Segoe UI Semilight" panose="020B0402040204020203" pitchFamily="34" charset="0"/>
+              </a:rPr>
+              <a:t>Share</a:t>
+            </a:r>
             <a:endParaRPr lang="en-NZ" sz="2400" dirty="0" smtClean="0">
               <a:solidFill>
                 <a:srgbClr val="3A537B"/>
@@ -7315,14 +8050,14 @@
               <a:buChar char="•"/>
             </a:pPr>
             <a:r>
-              <a:rPr lang="en-NZ" sz="2400" dirty="0" smtClean="0">
-                <a:solidFill>
-                  <a:srgbClr val="3A537B"/>
-                </a:solidFill>
-                <a:latin typeface="Segoe UI Semilight" panose="020B0402040204020203" pitchFamily="34" charset="0"/>
-                <a:cs typeface="Segoe UI Semilight" panose="020B0402040204020203" pitchFamily="34" charset="0"/>
-              </a:rPr>
-              <a:t>Background</a:t>
+              <a:rPr lang="en-NZ" sz="2000" dirty="0" smtClean="0">
+                <a:solidFill>
+                  <a:srgbClr val="3A537B"/>
+                </a:solidFill>
+                <a:latin typeface="Segoe UI Semilight" panose="020B0402040204020203" pitchFamily="34" charset="0"/>
+                <a:cs typeface="Segoe UI Semilight" panose="020B0402040204020203" pitchFamily="34" charset="0"/>
+              </a:rPr>
+              <a:t>Description</a:t>
             </a:r>
           </a:p>
           <a:p>
@@ -7331,14 +8066,14 @@
               <a:buChar char="•"/>
             </a:pPr>
             <a:r>
-              <a:rPr lang="en-NZ" sz="2400" dirty="0" smtClean="0">
-                <a:solidFill>
-                  <a:srgbClr val="3A537B"/>
-                </a:solidFill>
-                <a:latin typeface="Segoe UI Semilight" panose="020B0402040204020203" pitchFamily="34" charset="0"/>
-                <a:cs typeface="Segoe UI Semilight" panose="020B0402040204020203" pitchFamily="34" charset="0"/>
-              </a:rPr>
-              <a:t>Multi-size tile (Small, Medium, Wide, Large)</a:t>
+              <a:rPr lang="en-NZ" sz="2000" dirty="0" smtClean="0">
+                <a:solidFill>
+                  <a:srgbClr val="3A537B"/>
+                </a:solidFill>
+                <a:latin typeface="Segoe UI Semilight" panose="020B0402040204020203" pitchFamily="34" charset="0"/>
+                <a:cs typeface="Segoe UI Semilight" panose="020B0402040204020203" pitchFamily="34" charset="0"/>
+              </a:rPr>
+              <a:t>Screenshot</a:t>
             </a:r>
           </a:p>
           <a:p>
@@ -7347,14 +8082,14 @@
               <a:buChar char="•"/>
             </a:pPr>
             <a:r>
-              <a:rPr lang="en-NZ" sz="2400" dirty="0" smtClean="0">
-                <a:solidFill>
-                  <a:srgbClr val="3A537B"/>
-                </a:solidFill>
-                <a:latin typeface="Segoe UI Semilight" panose="020B0402040204020203" pitchFamily="34" charset="0"/>
-                <a:cs typeface="Segoe UI Semilight" panose="020B0402040204020203" pitchFamily="34" charset="0"/>
-              </a:rPr>
-              <a:t>Swipe up for all Apps</a:t>
+              <a:rPr lang="en-NZ" sz="2000" dirty="0" smtClean="0">
+                <a:solidFill>
+                  <a:srgbClr val="3A537B"/>
+                </a:solidFill>
+                <a:latin typeface="Segoe UI Semilight" panose="020B0402040204020203" pitchFamily="34" charset="0"/>
+                <a:cs typeface="Segoe UI Semilight" panose="020B0402040204020203" pitchFamily="34" charset="0"/>
+              </a:rPr>
+              <a:t>Link to Store</a:t>
             </a:r>
           </a:p>
           <a:p>
@@ -7363,14 +8098,14 @@
               <a:buChar char="•"/>
             </a:pPr>
             <a:r>
-              <a:rPr lang="en-NZ" sz="2400" dirty="0" smtClean="0">
-                <a:solidFill>
-                  <a:srgbClr val="3A537B"/>
-                </a:solidFill>
-                <a:latin typeface="Segoe UI Semilight" panose="020B0402040204020203" pitchFamily="34" charset="0"/>
-                <a:cs typeface="Segoe UI Semilight" panose="020B0402040204020203" pitchFamily="34" charset="0"/>
-              </a:rPr>
-              <a:t>Search Changes</a:t>
+              <a:rPr lang="en-NZ" sz="2000" dirty="0" smtClean="0">
+                <a:solidFill>
+                  <a:srgbClr val="3A537B"/>
+                </a:solidFill>
+                <a:latin typeface="Segoe UI Semilight" panose="020B0402040204020203" pitchFamily="34" charset="0"/>
+                <a:cs typeface="Segoe UI Semilight" panose="020B0402040204020203" pitchFamily="34" charset="0"/>
+              </a:rPr>
+              <a:t>Share from Snapped</a:t>
             </a:r>
           </a:p>
           <a:p>
@@ -7378,23 +8113,7 @@
               <a:buFont typeface="Arial" panose="020B0604020202020204" pitchFamily="34" charset="0"/>
               <a:buChar char="•"/>
             </a:pPr>
-            <a:r>
-              <a:rPr lang="en-NZ" sz="2400" dirty="0" smtClean="0">
-                <a:solidFill>
-                  <a:srgbClr val="3A537B"/>
-                </a:solidFill>
-                <a:latin typeface="Segoe UI Semilight" panose="020B0402040204020203" pitchFamily="34" charset="0"/>
-                <a:cs typeface="Segoe UI Semilight" panose="020B0402040204020203" pitchFamily="34" charset="0"/>
-              </a:rPr>
-              <a:t>Sync</a:t>
-            </a:r>
-          </a:p>
-          <a:p>
-            <a:pPr marL="285750" indent="-285750">
-              <a:buFont typeface="Arial" panose="020B0604020202020204" pitchFamily="34" charset="0"/>
-              <a:buChar char="•"/>
-            </a:pPr>
-            <a:endParaRPr lang="en-NZ" sz="2400" dirty="0">
+            <a:endParaRPr lang="en-NZ" sz="2000" dirty="0" smtClean="0">
               <a:solidFill>
                 <a:srgbClr val="3A537B"/>
               </a:solidFill>
@@ -7403,91 +8122,11 @@
             </a:endParaRPr>
           </a:p>
           <a:p>
-            <a:pPr marL="285750" indent="-285750">
-              <a:buFont typeface="Arial" panose="020B0604020202020204" pitchFamily="34" charset="0"/>
-              <a:buChar char="•"/>
-            </a:pPr>
-            <a:r>
-              <a:rPr lang="en-NZ" sz="2400" dirty="0" smtClean="0">
-                <a:solidFill>
-                  <a:srgbClr val="3A537B"/>
-                </a:solidFill>
-                <a:latin typeface="Segoe UI Semilight" panose="020B0402040204020203" pitchFamily="34" charset="0"/>
-                <a:cs typeface="Segoe UI Semilight" panose="020B0402040204020203" pitchFamily="34" charset="0"/>
-              </a:rPr>
-              <a:t>Share</a:t>
-            </a:r>
-          </a:p>
-          <a:p>
             <a:pPr marL="742950" lvl="1" indent="-285750">
               <a:buFont typeface="Arial" panose="020B0604020202020204" pitchFamily="34" charset="0"/>
               <a:buChar char="•"/>
             </a:pPr>
-            <a:r>
-              <a:rPr lang="en-NZ" sz="2400" dirty="0" smtClean="0">
-                <a:solidFill>
-                  <a:srgbClr val="3A537B"/>
-                </a:solidFill>
-                <a:latin typeface="Segoe UI Semilight" panose="020B0402040204020203" pitchFamily="34" charset="0"/>
-                <a:cs typeface="Segoe UI Semilight" panose="020B0402040204020203" pitchFamily="34" charset="0"/>
-              </a:rPr>
-              <a:t>Description</a:t>
-            </a:r>
-          </a:p>
-          <a:p>
-            <a:pPr marL="742950" lvl="1" indent="-285750">
-              <a:buFont typeface="Arial" panose="020B0604020202020204" pitchFamily="34" charset="0"/>
-              <a:buChar char="•"/>
-            </a:pPr>
-            <a:r>
-              <a:rPr lang="en-NZ" sz="2400" dirty="0" smtClean="0">
-                <a:solidFill>
-                  <a:srgbClr val="3A537B"/>
-                </a:solidFill>
-                <a:latin typeface="Segoe UI Semilight" panose="020B0402040204020203" pitchFamily="34" charset="0"/>
-                <a:cs typeface="Segoe UI Semilight" panose="020B0402040204020203" pitchFamily="34" charset="0"/>
-              </a:rPr>
-              <a:t>Screenshot</a:t>
-            </a:r>
-          </a:p>
-          <a:p>
-            <a:pPr marL="742950" lvl="1" indent="-285750">
-              <a:buFont typeface="Arial" panose="020B0604020202020204" pitchFamily="34" charset="0"/>
-              <a:buChar char="•"/>
-            </a:pPr>
-            <a:r>
-              <a:rPr lang="en-NZ" sz="2400" dirty="0" smtClean="0">
-                <a:solidFill>
-                  <a:srgbClr val="3A537B"/>
-                </a:solidFill>
-                <a:latin typeface="Segoe UI Semilight" panose="020B0402040204020203" pitchFamily="34" charset="0"/>
-                <a:cs typeface="Segoe UI Semilight" panose="020B0402040204020203" pitchFamily="34" charset="0"/>
-              </a:rPr>
-              <a:t>Link to Store</a:t>
-            </a:r>
-          </a:p>
-          <a:p>
-            <a:pPr marL="742950" lvl="1" indent="-285750">
-              <a:buFont typeface="Arial" panose="020B0604020202020204" pitchFamily="34" charset="0"/>
-              <a:buChar char="•"/>
-            </a:pPr>
-            <a:r>
-              <a:rPr lang="en-NZ" sz="2400" dirty="0" smtClean="0">
-                <a:solidFill>
-                  <a:srgbClr val="3A537B"/>
-                </a:solidFill>
-                <a:latin typeface="Segoe UI Semilight" panose="020B0402040204020203" pitchFamily="34" charset="0"/>
-                <a:cs typeface="Segoe UI Semilight" panose="020B0402040204020203" pitchFamily="34" charset="0"/>
-              </a:rPr>
-              <a:t>Share from Snapped</a:t>
-            </a:r>
-          </a:p>
-          <a:p>
-            <a:pPr marL="742950" lvl="1" indent="-285750">
-              <a:buFont typeface="Arial" panose="020B0604020202020204" pitchFamily="34" charset="0"/>
-              <a:buChar char="•"/>
-            </a:pPr>
-            <a:endParaRPr lang="en-NZ" sz="2400" dirty="0" smtClean="0">
+            <a:endParaRPr lang="en-NZ" sz="2000" dirty="0" smtClean="0">
               <a:solidFill>
                 <a:srgbClr val="3A537B"/>
               </a:solidFill>
@@ -7500,7 +8139,7 @@
               <a:buFont typeface="Arial" panose="020B0604020202020204" pitchFamily="34" charset="0"/>
               <a:buChar char="•"/>
             </a:pPr>
-            <a:endParaRPr lang="en-NZ" sz="2400" dirty="0" smtClean="0">
+            <a:endParaRPr lang="en-NZ" sz="2000" dirty="0" smtClean="0">
               <a:solidFill>
                 <a:srgbClr val="3A537B"/>
               </a:solidFill>
@@ -7509,11 +8148,11 @@
             </a:endParaRPr>
           </a:p>
           <a:p>
-            <a:pPr marL="742950" lvl="1" indent="-285750">
-              <a:buFont typeface="Arial" panose="020B0604020202020204" pitchFamily="34" charset="0"/>
-              <a:buChar char="•"/>
-            </a:pPr>
-            <a:endParaRPr lang="en-NZ" sz="2400" dirty="0" smtClean="0">
+            <a:pPr marL="285750" indent="-285750">
+              <a:buFont typeface="Arial" panose="020B0604020202020204" pitchFamily="34" charset="0"/>
+              <a:buChar char="•"/>
+            </a:pPr>
+            <a:endParaRPr lang="en-NZ" sz="2000" dirty="0">
               <a:solidFill>
                 <a:srgbClr val="3A537B"/>
               </a:solidFill>
@@ -7526,20 +8165,7 @@
               <a:buFont typeface="Arial" panose="020B0604020202020204" pitchFamily="34" charset="0"/>
               <a:buChar char="•"/>
             </a:pPr>
-            <a:endParaRPr lang="en-NZ" sz="2400" dirty="0">
-              <a:solidFill>
-                <a:srgbClr val="3A537B"/>
-              </a:solidFill>
-              <a:latin typeface="Segoe UI Semilight" panose="020B0402040204020203" pitchFamily="34" charset="0"/>
-              <a:cs typeface="Segoe UI Semilight" panose="020B0402040204020203" pitchFamily="34" charset="0"/>
-            </a:endParaRPr>
-          </a:p>
-          <a:p>
-            <a:pPr marL="285750" indent="-285750">
-              <a:buFont typeface="Arial" panose="020B0604020202020204" pitchFamily="34" charset="0"/>
-              <a:buChar char="•"/>
-            </a:pPr>
-            <a:endParaRPr lang="en-NZ" sz="2400" dirty="0" smtClean="0">
+            <a:endParaRPr lang="en-NZ" sz="2000" dirty="0" smtClean="0">
               <a:solidFill>
                 <a:srgbClr val="3A537B"/>
               </a:solidFill>
@@ -8249,7 +8875,7 @@
         <p:spPr>
           <a:xfrm>
             <a:off x="609600" y="1828800"/>
-            <a:ext cx="5566204" cy="6370975"/>
+            <a:ext cx="4868897" cy="6001643"/>
           </a:xfrm>
           <a:prstGeom prst="rect">
             <a:avLst/>
@@ -8312,7 +8938,7 @@
               <a:buChar char="•"/>
             </a:pPr>
             <a:r>
-              <a:rPr lang="en-NZ" sz="2400" dirty="0">
+              <a:rPr lang="en-NZ" sz="2000" dirty="0">
                 <a:solidFill>
                   <a:srgbClr val="3A537B"/>
                 </a:solidFill>
@@ -8322,7 +8948,7 @@
               <a:t>Hub </a:t>
             </a:r>
             <a:r>
-              <a:rPr lang="en-NZ" sz="2400" dirty="0" smtClean="0">
+              <a:rPr lang="en-NZ" sz="2000" dirty="0" smtClean="0">
                 <a:solidFill>
                   <a:srgbClr val="3A537B"/>
                 </a:solidFill>
@@ -8367,7 +8993,7 @@
               <a:buChar char="•"/>
             </a:pPr>
             <a:r>
-              <a:rPr lang="en-NZ" sz="2400" dirty="0">
+              <a:rPr lang="en-NZ" sz="2000" dirty="0">
                 <a:solidFill>
                   <a:srgbClr val="3A537B"/>
                 </a:solidFill>
@@ -8383,7 +9009,7 @@
               <a:buChar char="•"/>
             </a:pPr>
             <a:r>
-              <a:rPr lang="en-NZ" sz="2400" dirty="0">
+              <a:rPr lang="en-NZ" sz="2000" dirty="0">
                 <a:solidFill>
                   <a:srgbClr val="3A537B"/>
                 </a:solidFill>
@@ -8399,7 +9025,7 @@
               <a:buChar char="•"/>
             </a:pPr>
             <a:r>
-              <a:rPr lang="en-NZ" sz="2400" dirty="0">
+              <a:rPr lang="en-NZ" sz="2000" dirty="0">
                 <a:solidFill>
                   <a:srgbClr val="3A537B"/>
                 </a:solidFill>
@@ -8415,7 +9041,7 @@
               <a:buChar char="•"/>
             </a:pPr>
             <a:r>
-              <a:rPr lang="en-NZ" sz="2400" dirty="0">
+              <a:rPr lang="en-NZ" sz="2000" dirty="0">
                 <a:solidFill>
                   <a:srgbClr val="3A537B"/>
                 </a:solidFill>
@@ -8431,7 +9057,7 @@
               <a:buChar char="•"/>
             </a:pPr>
             <a:r>
-              <a:rPr lang="en-NZ" sz="2400" dirty="0">
+              <a:rPr lang="en-NZ" sz="2000" dirty="0">
                 <a:solidFill>
                   <a:srgbClr val="3A537B"/>
                 </a:solidFill>
@@ -8646,7 +9272,7 @@
         <p:spPr>
           <a:xfrm>
             <a:off x="612512" y="1752600"/>
-            <a:ext cx="4594528" cy="5632311"/>
+            <a:ext cx="3983783" cy="4955203"/>
           </a:xfrm>
           <a:prstGeom prst="rect">
             <a:avLst/>
@@ -8680,7 +9306,7 @@
               <a:buChar char="•"/>
             </a:pPr>
             <a:r>
-              <a:rPr lang="en-NZ" sz="2400" dirty="0" smtClean="0">
+              <a:rPr lang="en-NZ" sz="2000" dirty="0" smtClean="0">
                 <a:solidFill>
                   <a:srgbClr val="3A537B"/>
                 </a:solidFill>
@@ -8690,7 +9316,7 @@
               <a:t>Sample </a:t>
             </a:r>
             <a:r>
-              <a:rPr lang="en-NZ" sz="2400" dirty="0">
+              <a:rPr lang="en-NZ" sz="2000" dirty="0">
                 <a:solidFill>
                   <a:srgbClr val="3A537B"/>
                 </a:solidFill>
@@ -8700,7 +9326,7 @@
               <a:t>data now in JSON </a:t>
             </a:r>
             <a:r>
-              <a:rPr lang="en-NZ" sz="2400" dirty="0" smtClean="0">
+              <a:rPr lang="en-NZ" sz="2000" dirty="0" smtClean="0">
                 <a:solidFill>
                   <a:srgbClr val="3A537B"/>
                 </a:solidFill>
@@ -8716,7 +9342,7 @@
               <a:buChar char="•"/>
             </a:pPr>
             <a:r>
-              <a:rPr lang="en-NZ" sz="2400" dirty="0" smtClean="0">
+              <a:rPr lang="en-NZ" sz="2000" dirty="0" smtClean="0">
                 <a:solidFill>
                   <a:srgbClr val="3A537B"/>
                 </a:solidFill>
@@ -8726,7 +9352,7 @@
               <a:t>Still no </a:t>
             </a:r>
             <a:r>
-              <a:rPr lang="en-NZ" sz="2400" dirty="0" err="1" smtClean="0">
+              <a:rPr lang="en-NZ" sz="2000" dirty="0" err="1" smtClean="0">
                 <a:solidFill>
                   <a:srgbClr val="3A537B"/>
                 </a:solidFill>
@@ -8735,7 +9361,7 @@
               </a:rPr>
               <a:t>JSON.Net</a:t>
             </a:r>
-            <a:endParaRPr lang="en-NZ" sz="2400" dirty="0">
+            <a:endParaRPr lang="en-NZ" sz="2000" dirty="0">
               <a:solidFill>
                 <a:srgbClr val="3A537B"/>
               </a:solidFill>
@@ -8749,7 +9375,7 @@
               <a:buChar char="•"/>
             </a:pPr>
             <a:r>
-              <a:rPr lang="en-NZ" sz="2400" dirty="0" smtClean="0">
+              <a:rPr lang="en-NZ" sz="2000" dirty="0" smtClean="0">
                 <a:solidFill>
                   <a:srgbClr val="3A537B"/>
                 </a:solidFill>
@@ -8759,7 +9385,7 @@
               <a:t>No </a:t>
             </a:r>
             <a:r>
-              <a:rPr lang="en-NZ" sz="2400" dirty="0" err="1" smtClean="0">
+              <a:rPr lang="en-NZ" sz="2000" dirty="0" err="1" smtClean="0">
                 <a:solidFill>
                   <a:srgbClr val="3A537B"/>
                 </a:solidFill>
@@ -8768,7 +9394,7 @@
               </a:rPr>
               <a:t>StandardStyles.xaml</a:t>
             </a:r>
-            <a:endParaRPr lang="en-NZ" sz="2400" dirty="0" smtClean="0">
+            <a:endParaRPr lang="en-NZ" sz="2000" dirty="0" smtClean="0">
               <a:solidFill>
                 <a:srgbClr val="3A537B"/>
               </a:solidFill>
@@ -8781,7 +9407,7 @@
               <a:buFont typeface="Arial" panose="020B0604020202020204" pitchFamily="34" charset="0"/>
               <a:buChar char="•"/>
             </a:pPr>
-            <a:endParaRPr lang="en-NZ" sz="2400" dirty="0">
+            <a:endParaRPr lang="en-NZ" sz="2000" dirty="0">
               <a:solidFill>
                 <a:srgbClr val="3A537B"/>
               </a:solidFill>
@@ -8804,6 +9430,13 @@
               </a:rPr>
               <a:t>Controls</a:t>
             </a:r>
+            <a:endParaRPr lang="en-NZ" sz="2000" dirty="0" smtClean="0">
+              <a:solidFill>
+                <a:srgbClr val="3A537B"/>
+              </a:solidFill>
+              <a:latin typeface="Segoe UI Semilight" panose="020B0402040204020203" pitchFamily="34" charset="0"/>
+              <a:cs typeface="Segoe UI Semilight" panose="020B0402040204020203" pitchFamily="34" charset="0"/>
+            </a:endParaRPr>
           </a:p>
           <a:p>
             <a:pPr marL="742950" lvl="1" indent="-285750">
@@ -8811,7 +9444,7 @@
               <a:buChar char="•"/>
             </a:pPr>
             <a:r>
-              <a:rPr lang="en-NZ" sz="2400" dirty="0" smtClean="0">
+              <a:rPr lang="en-NZ" sz="2000" dirty="0" smtClean="0">
                 <a:solidFill>
                   <a:srgbClr val="3A537B"/>
                 </a:solidFill>
@@ -8827,7 +9460,7 @@
               <a:buChar char="•"/>
             </a:pPr>
             <a:r>
-              <a:rPr lang="en-NZ" sz="2400" dirty="0" err="1" smtClean="0">
+              <a:rPr lang="en-NZ" sz="2000" dirty="0" err="1" smtClean="0">
                 <a:solidFill>
                   <a:srgbClr val="3A537B"/>
                 </a:solidFill>
@@ -8837,7 +9470,7 @@
               <a:t>SearchBox</a:t>
             </a:r>
             <a:r>
-              <a:rPr lang="en-NZ" sz="2400" dirty="0" smtClean="0">
+              <a:rPr lang="en-NZ" sz="2000" dirty="0" smtClean="0">
                 <a:solidFill>
                   <a:srgbClr val="3A537B"/>
                 </a:solidFill>
@@ -8853,7 +9486,7 @@
               <a:buChar char="•"/>
             </a:pPr>
             <a:r>
-              <a:rPr lang="en-NZ" sz="2400" dirty="0" err="1" smtClean="0">
+              <a:rPr lang="en-NZ" sz="2000" dirty="0" err="1" smtClean="0">
                 <a:solidFill>
                   <a:srgbClr val="3A537B"/>
                 </a:solidFill>
@@ -8863,7 +9496,7 @@
               <a:t>Flyout</a:t>
             </a:r>
             <a:r>
-              <a:rPr lang="en-NZ" sz="2400" dirty="0" smtClean="0">
+              <a:rPr lang="en-NZ" sz="2000" dirty="0" smtClean="0">
                 <a:solidFill>
                   <a:srgbClr val="3A537B"/>
                 </a:solidFill>
@@ -8879,7 +9512,7 @@
               <a:buChar char="•"/>
             </a:pPr>
             <a:r>
-              <a:rPr lang="en-NZ" sz="2400" dirty="0" err="1" smtClean="0">
+              <a:rPr lang="en-NZ" sz="2000" dirty="0" err="1" smtClean="0">
                 <a:solidFill>
                   <a:srgbClr val="3A537B"/>
                 </a:solidFill>
@@ -8889,7 +9522,7 @@
               <a:t>SettingsFlyout</a:t>
             </a:r>
             <a:r>
-              <a:rPr lang="en-NZ" sz="2400" dirty="0" smtClean="0">
+              <a:rPr lang="en-NZ" sz="2000" dirty="0" smtClean="0">
                 <a:solidFill>
                   <a:srgbClr val="3A537B"/>
                 </a:solidFill>
@@ -8905,7 +9538,7 @@
               <a:buChar char="•"/>
             </a:pPr>
             <a:r>
-              <a:rPr lang="en-NZ" sz="2400" dirty="0" err="1" smtClean="0">
+              <a:rPr lang="en-NZ" sz="2000" dirty="0" err="1" smtClean="0">
                 <a:solidFill>
                   <a:srgbClr val="3A537B"/>
                 </a:solidFill>
@@ -8915,7 +9548,7 @@
               <a:t>DateTimePicker</a:t>
             </a:r>
             <a:r>
-              <a:rPr lang="en-NZ" sz="2400" dirty="0" smtClean="0">
+              <a:rPr lang="en-NZ" sz="2000" dirty="0" smtClean="0">
                 <a:solidFill>
                   <a:srgbClr val="3A537B"/>
                 </a:solidFill>
@@ -8931,7 +9564,7 @@
               <a:buChar char="•"/>
             </a:pPr>
             <a:r>
-              <a:rPr lang="en-NZ" sz="2400" dirty="0">
+              <a:rPr lang="en-NZ" sz="2000" dirty="0">
                 <a:solidFill>
                   <a:srgbClr val="3A537B"/>
                 </a:solidFill>
@@ -8947,7 +9580,7 @@
               <a:buChar char="•"/>
             </a:pPr>
             <a:r>
-              <a:rPr lang="en-NZ" sz="2400" dirty="0" err="1" smtClean="0">
+              <a:rPr lang="en-NZ" sz="2000" dirty="0" err="1" smtClean="0">
                 <a:solidFill>
                   <a:srgbClr val="3A537B"/>
                 </a:solidFill>
@@ -8956,7 +9589,7 @@
               </a:rPr>
               <a:t>WebView</a:t>
             </a:r>
-            <a:endParaRPr lang="en-NZ" sz="2400" dirty="0" smtClean="0">
+            <a:endParaRPr lang="en-NZ" sz="2000" dirty="0" smtClean="0">
               <a:solidFill>
                 <a:srgbClr val="3A537B"/>
               </a:solidFill>
@@ -9866,21 +10499,6 @@
 </file>
 
 <file path=customXml/item1.xml><?xml version="1.0" encoding="utf-8"?>
-<p:properties xmlns:p="http://schemas.microsoft.com/office/2006/metadata/properties" xmlns:xsi="http://www.w3.org/2001/XMLSchema-instance">
-  <documentManagement/>
-</p:properties>
-</file>
-
-<file path=customXml/item2.xml><?xml version="1.0" encoding="utf-8"?>
-<?mso-contentType ?>
-<FormTemplates xmlns="http://schemas.microsoft.com/sharepoint/v3/contenttype/forms">
-  <Display>DocumentLibraryForm</Display>
-  <Edit>DocumentLibraryForm</Edit>
-  <New>DocumentLibraryForm</New>
-</FormTemplates>
-</file>
-
-<file path=customXml/item3.xml><?xml version="1.0" encoding="utf-8"?>
 <ct:contentTypeSchema xmlns:ct="http://schemas.microsoft.com/office/2006/metadata/contentType" xmlns:ma="http://schemas.microsoft.com/office/2006/metadata/properties/metaAttributes" ct:_="" ma:_="" ma:contentTypeName="Document" ma:contentTypeID="0x0101004DF6D0871B95904AABD22536D8AC85C8" ma:contentTypeVersion="0" ma:contentTypeDescription="Create a new document." ma:contentTypeScope="" ma:versionID="49efcf3338630220492e4247eaca93e8">
   <xsd:schema xmlns:xsd="http://www.w3.org/2001/XMLSchema" xmlns:p="http://schemas.microsoft.com/office/2006/metadata/properties" targetNamespace="http://schemas.microsoft.com/office/2006/metadata/properties" ma:root="true" ma:fieldsID="4aeb20c0e3442673af7ee10786458764">
     <xsd:element name="properties">
@@ -9929,10 +10547,32 @@
 </ct:contentTypeSchema>
 </file>
 
+<file path=customXml/item2.xml><?xml version="1.0" encoding="utf-8"?>
+<?mso-contentType ?>
+<FormTemplates xmlns="http://schemas.microsoft.com/sharepoint/v3/contenttype/forms">
+  <Display>DocumentLibraryForm</Display>
+  <Edit>DocumentLibraryForm</Edit>
+  <New>DocumentLibraryForm</New>
+</FormTemplates>
+</file>
+
+<file path=customXml/item3.xml><?xml version="1.0" encoding="utf-8"?>
+<p:properties xmlns:p="http://schemas.microsoft.com/office/2006/metadata/properties" xmlns:xsi="http://www.w3.org/2001/XMLSchema-instance">
+  <documentManagement/>
+</p:properties>
+</file>
+
 <file path=customXml/itemProps1.xml><?xml version="1.0" encoding="utf-8"?>
-<ds:datastoreItem xmlns:ds="http://schemas.openxmlformats.org/officeDocument/2006/customXml" ds:itemID="{AEBD4C7A-EE81-430E-8E48-8F597B2AAF83}">
+<ds:datastoreItem xmlns:ds="http://schemas.openxmlformats.org/officeDocument/2006/customXml" ds:itemID="{7E1D9E91-416C-4888-A8AA-BE42FEF97FEF}">
   <ds:schemaRefs>
+    <ds:schemaRef ds:uri="http://schemas.microsoft.com/office/2006/metadata/contentType"/>
+    <ds:schemaRef ds:uri="http://schemas.microsoft.com/office/2006/metadata/properties/metaAttributes"/>
+    <ds:schemaRef ds:uri="http://www.w3.org/2001/XMLSchema"/>
     <ds:schemaRef ds:uri="http://schemas.microsoft.com/office/2006/metadata/properties"/>
+    <ds:schemaRef ds:uri="http://schemas.openxmlformats.org/package/2006/metadata/core-properties"/>
+    <ds:schemaRef ds:uri="http://purl.org/dc/elements/1.1/"/>
+    <ds:schemaRef ds:uri="http://purl.org/dc/terms/"/>
+    <ds:schemaRef ds:uri="http://schemas.microsoft.com/office/internal/2005/internalDocumentation"/>
   </ds:schemaRefs>
 </ds:datastoreItem>
 </file>
@@ -9946,16 +10586,9 @@
 </file>
 
 <file path=customXml/itemProps3.xml><?xml version="1.0" encoding="utf-8"?>
-<ds:datastoreItem xmlns:ds="http://schemas.openxmlformats.org/officeDocument/2006/customXml" ds:itemID="{7E1D9E91-416C-4888-A8AA-BE42FEF97FEF}">
+<ds:datastoreItem xmlns:ds="http://schemas.openxmlformats.org/officeDocument/2006/customXml" ds:itemID="{AEBD4C7A-EE81-430E-8E48-8F597B2AAF83}">
   <ds:schemaRefs>
-    <ds:schemaRef ds:uri="http://schemas.microsoft.com/office/2006/metadata/contentType"/>
-    <ds:schemaRef ds:uri="http://schemas.microsoft.com/office/2006/metadata/properties/metaAttributes"/>
-    <ds:schemaRef ds:uri="http://www.w3.org/2001/XMLSchema"/>
     <ds:schemaRef ds:uri="http://schemas.microsoft.com/office/2006/metadata/properties"/>
-    <ds:schemaRef ds:uri="http://schemas.openxmlformats.org/package/2006/metadata/core-properties"/>
-    <ds:schemaRef ds:uri="http://purl.org/dc/elements/1.1/"/>
-    <ds:schemaRef ds:uri="http://purl.org/dc/terms/"/>
-    <ds:schemaRef ds:uri="http://schemas.microsoft.com/office/internal/2005/internalDocumentation"/>
   </ds:schemaRefs>
 </ds:datastoreItem>
 </file>
</xml_diff>

<commit_message>
Updated some notes for the demo
</commit_message>
<xml_diff>
--- a/WhatsNewInWindows81/WhatsNewInWindows81.pptx
+++ b/WhatsNewInWindows81/WhatsNewInWindows81.pptx
@@ -2008,10 +2008,9 @@
               <a:buChar char="-"/>
             </a:pPr>
             <a:r>
-              <a:rPr lang="en-NZ" baseline="0" smtClean="0"/>
+              <a:rPr lang="en-NZ" baseline="0" dirty="0" smtClean="0"/>
               <a:t>Design Data</a:t>
             </a:r>
-            <a:endParaRPr lang="en-NZ" baseline="0" dirty="0" smtClean="0"/>
           </a:p>
           <a:p>
             <a:pPr marL="0" indent="0">
@@ -2079,84 +2078,6 @@
           <a:bodyPr/>
           <a:lstStyle/>
           <a:p>
-            <a:r>
-              <a:rPr lang="en-AU" dirty="0" smtClean="0"/>
-              <a:t>Hub – has sections, helps do things.</a:t>
-            </a:r>
-          </a:p>
-          <a:p>
-            <a:endParaRPr lang="en-AU" dirty="0" smtClean="0"/>
-          </a:p>
-          <a:p>
-            <a:r>
-              <a:rPr lang="en-AU" dirty="0" err="1" smtClean="0"/>
-              <a:t>Searchbox</a:t>
-            </a:r>
-            <a:endParaRPr lang="en-AU" dirty="0" smtClean="0"/>
-          </a:p>
-          <a:p>
-            <a:r>
-              <a:rPr lang="en-AU" baseline="0" dirty="0" smtClean="0"/>
-              <a:t>-   Because the search charm is dead!</a:t>
-            </a:r>
-            <a:endParaRPr lang="en-AU" dirty="0" smtClean="0"/>
-          </a:p>
-          <a:p>
-            <a:pPr marL="171450" indent="-171450">
-              <a:buFontTx/>
-              <a:buChar char="-"/>
-            </a:pPr>
-            <a:r>
-              <a:rPr lang="en-AU" dirty="0" err="1" smtClean="0"/>
-              <a:t>onquerychanged</a:t>
-            </a:r>
-            <a:endParaRPr lang="en-AU" dirty="0" smtClean="0"/>
-          </a:p>
-          <a:p>
-            <a:pPr marL="171450" indent="-171450">
-              <a:buFontTx/>
-              <a:buChar char="-"/>
-            </a:pPr>
-            <a:r>
-              <a:rPr lang="en-AU" dirty="0" err="1" smtClean="0"/>
-              <a:t>onquerysubmitted</a:t>
-            </a:r>
-            <a:endParaRPr lang="en-AU" dirty="0" smtClean="0"/>
-          </a:p>
-          <a:p>
-            <a:pPr marL="171450" indent="-171450">
-              <a:buFontTx/>
-              <a:buChar char="-"/>
-            </a:pPr>
-            <a:r>
-              <a:rPr lang="en-AU" dirty="0" err="1" smtClean="0"/>
-              <a:t>onreceivingfocusonkeyboardinput</a:t>
-            </a:r>
-            <a:endParaRPr lang="en-AU" dirty="0" smtClean="0"/>
-          </a:p>
-          <a:p>
-            <a:pPr marL="171450" indent="-171450">
-              <a:buFontTx/>
-              <a:buChar char="-"/>
-            </a:pPr>
-            <a:r>
-              <a:rPr lang="en-AU" dirty="0" err="1" smtClean="0"/>
-              <a:t>onresultsuggestionschosen</a:t>
-            </a:r>
-            <a:endParaRPr lang="en-AU" dirty="0" smtClean="0"/>
-          </a:p>
-          <a:p>
-            <a:pPr marL="171450" indent="-171450">
-              <a:buFontTx/>
-              <a:buChar char="-"/>
-            </a:pPr>
-            <a:r>
-              <a:rPr lang="en-AU" dirty="0" err="1" smtClean="0"/>
-              <a:t>onsuggestionsrequested</a:t>
-            </a:r>
-            <a:endParaRPr lang="en-AU" dirty="0" smtClean="0"/>
-          </a:p>
-          <a:p>
             <a:endParaRPr lang="en-NZ" dirty="0"/>
           </a:p>
         </p:txBody>
@@ -2218,6 +2139,280 @@
           <a:bodyPr/>
           <a:lstStyle/>
           <a:p>
+            <a:r>
+              <a:rPr lang="en-AU" dirty="0" smtClean="0"/>
+              <a:t>Hub – has sections, helps do things.</a:t>
+            </a:r>
+          </a:p>
+          <a:p>
+            <a:r>
+              <a:rPr lang="en-AU" dirty="0" smtClean="0"/>
+              <a:t> - Similar to XAML version</a:t>
+            </a:r>
+          </a:p>
+          <a:p>
+            <a:r>
+              <a:rPr lang="en-AU" dirty="0" smtClean="0"/>
+              <a:t> - add a new section and throw in some HTML</a:t>
+            </a:r>
+          </a:p>
+          <a:p>
+            <a:endParaRPr lang="en-AU" dirty="0" smtClean="0"/>
+          </a:p>
+          <a:p>
+            <a:r>
+              <a:rPr lang="en-AU" dirty="0" smtClean="0"/>
+              <a:t>Media Queries</a:t>
+            </a:r>
+          </a:p>
+          <a:p>
+            <a:pPr marL="171450" indent="-171450">
+              <a:buFontTx/>
+              <a:buChar char="-"/>
+            </a:pPr>
+            <a:r>
+              <a:rPr lang="en-AU" dirty="0" smtClean="0"/>
+              <a:t>Don’t use </a:t>
+            </a:r>
+            <a:r>
+              <a:rPr lang="en-NZ" sz="1200" kern="1200" dirty="0" smtClean="0">
+                <a:solidFill>
+                  <a:schemeClr val="tx1"/>
+                </a:solidFill>
+                <a:latin typeface="+mn-lt"/>
+                <a:ea typeface="+mn-ea"/>
+                <a:cs typeface="+mn-cs"/>
+              </a:rPr>
+              <a:t>-</a:t>
+            </a:r>
+            <a:r>
+              <a:rPr lang="en-NZ" sz="1200" kern="1200" dirty="0" err="1" smtClean="0">
+                <a:solidFill>
+                  <a:schemeClr val="tx1"/>
+                </a:solidFill>
+                <a:latin typeface="+mn-lt"/>
+                <a:ea typeface="+mn-ea"/>
+                <a:cs typeface="+mn-cs"/>
+              </a:rPr>
+              <a:t>ms</a:t>
+            </a:r>
+            <a:r>
+              <a:rPr lang="en-NZ" sz="1200" kern="1200" dirty="0" smtClean="0">
+                <a:solidFill>
+                  <a:schemeClr val="tx1"/>
+                </a:solidFill>
+                <a:latin typeface="+mn-lt"/>
+                <a:ea typeface="+mn-ea"/>
+                <a:cs typeface="+mn-cs"/>
+              </a:rPr>
+              <a:t>-view-state</a:t>
+            </a:r>
+          </a:p>
+          <a:p>
+            <a:pPr marL="171450" indent="-171450">
+              <a:buFontTx/>
+              <a:buChar char="-"/>
+            </a:pPr>
+            <a:r>
+              <a:rPr lang="en-AU" sz="1200" kern="1200" dirty="0" smtClean="0">
+                <a:solidFill>
+                  <a:schemeClr val="tx1"/>
+                </a:solidFill>
+                <a:latin typeface="+mn-lt"/>
+                <a:ea typeface="+mn-ea"/>
+                <a:cs typeface="+mn-cs"/>
+              </a:rPr>
+              <a:t>Do</a:t>
+            </a:r>
+            <a:r>
+              <a:rPr lang="en-AU" sz="1200" kern="1200" baseline="0" dirty="0" smtClean="0">
+                <a:solidFill>
+                  <a:schemeClr val="tx1"/>
+                </a:solidFill>
+                <a:latin typeface="+mn-lt"/>
+                <a:ea typeface="+mn-ea"/>
+                <a:cs typeface="+mn-cs"/>
+              </a:rPr>
+              <a:t> </a:t>
+            </a:r>
+            <a:r>
+              <a:rPr lang="en-AU" sz="1200" kern="1200" baseline="0" smtClean="0">
+                <a:solidFill>
+                  <a:schemeClr val="tx1"/>
+                </a:solidFill>
+                <a:latin typeface="+mn-lt"/>
+                <a:ea typeface="+mn-ea"/>
+                <a:cs typeface="+mn-cs"/>
+              </a:rPr>
+              <a:t>use Width</a:t>
+            </a:r>
+            <a:endParaRPr lang="en-NZ" sz="1200" kern="1200" dirty="0" smtClean="0">
+              <a:solidFill>
+                <a:schemeClr val="tx1"/>
+              </a:solidFill>
+              <a:latin typeface="+mn-lt"/>
+              <a:ea typeface="+mn-ea"/>
+              <a:cs typeface="+mn-cs"/>
+            </a:endParaRPr>
+          </a:p>
+          <a:p>
+            <a:r>
+              <a:rPr lang="en-NZ" sz="1200" kern="1200" dirty="0" smtClean="0">
+                <a:solidFill>
+                  <a:schemeClr val="tx1"/>
+                </a:solidFill>
+                <a:latin typeface="+mn-lt"/>
+                <a:ea typeface="+mn-ea"/>
+                <a:cs typeface="+mn-cs"/>
+              </a:rPr>
+              <a:t>- @media screen and (max-width: 760) { }</a:t>
+            </a:r>
+            <a:endParaRPr lang="en-AU" dirty="0" smtClean="0"/>
+          </a:p>
+          <a:p>
+            <a:endParaRPr lang="en-AU" dirty="0" smtClean="0"/>
+          </a:p>
+          <a:p>
+            <a:endParaRPr lang="en-AU" dirty="0" smtClean="0"/>
+          </a:p>
+          <a:p>
+            <a:r>
+              <a:rPr lang="en-AU" dirty="0" err="1" smtClean="0"/>
+              <a:t>Searchbox</a:t>
+            </a:r>
+            <a:endParaRPr lang="en-AU" dirty="0" smtClean="0"/>
+          </a:p>
+          <a:p>
+            <a:r>
+              <a:rPr lang="en-AU" baseline="0" dirty="0" smtClean="0"/>
+              <a:t>-   </a:t>
+            </a:r>
+            <a:r>
+              <a:rPr lang="en-AU" dirty="0" err="1" smtClean="0"/>
+              <a:t>onquerychanged</a:t>
+            </a:r>
+            <a:endParaRPr lang="en-AU" dirty="0" smtClean="0"/>
+          </a:p>
+          <a:p>
+            <a:pPr marL="171450" indent="-171450">
+              <a:buFontTx/>
+              <a:buChar char="-"/>
+            </a:pPr>
+            <a:r>
+              <a:rPr lang="en-AU" dirty="0" err="1" smtClean="0"/>
+              <a:t>onquerysubmitted</a:t>
+            </a:r>
+            <a:endParaRPr lang="en-AU" dirty="0" smtClean="0"/>
+          </a:p>
+          <a:p>
+            <a:pPr marL="171450" indent="-171450">
+              <a:buFontTx/>
+              <a:buChar char="-"/>
+            </a:pPr>
+            <a:r>
+              <a:rPr lang="en-AU" dirty="0" err="1" smtClean="0"/>
+              <a:t>onreceivingfocusonkeyboardinput</a:t>
+            </a:r>
+            <a:endParaRPr lang="en-AU" dirty="0" smtClean="0"/>
+          </a:p>
+          <a:p>
+            <a:pPr marL="171450" indent="-171450">
+              <a:buFontTx/>
+              <a:buChar char="-"/>
+            </a:pPr>
+            <a:r>
+              <a:rPr lang="en-AU" dirty="0" err="1" smtClean="0"/>
+              <a:t>onresultsuggestionschosen</a:t>
+            </a:r>
+            <a:endParaRPr lang="en-AU" dirty="0" smtClean="0"/>
+          </a:p>
+          <a:p>
+            <a:pPr marL="171450" indent="-171450">
+              <a:buFontTx/>
+              <a:buChar char="-"/>
+            </a:pPr>
+            <a:r>
+              <a:rPr lang="en-AU" dirty="0" err="1" smtClean="0"/>
+              <a:t>onsuggestionsrequested</a:t>
+            </a:r>
+            <a:endParaRPr lang="en-AU" dirty="0" smtClean="0"/>
+          </a:p>
+          <a:p>
+            <a:endParaRPr lang="en-AU" dirty="0" smtClean="0"/>
+          </a:p>
+          <a:p>
+            <a:endParaRPr lang="en-AU" dirty="0" smtClean="0"/>
+          </a:p>
+          <a:p>
+            <a:r>
+              <a:rPr lang="en-AU" dirty="0" smtClean="0"/>
+              <a:t>Repeater/</a:t>
+            </a:r>
+            <a:r>
+              <a:rPr lang="en-AU" dirty="0" err="1" smtClean="0"/>
+              <a:t>ItemContainer</a:t>
+            </a:r>
+            <a:r>
+              <a:rPr lang="en-AU" baseline="0" dirty="0" smtClean="0"/>
+              <a:t> Combo for light weight </a:t>
+            </a:r>
+            <a:r>
+              <a:rPr lang="en-AU" baseline="0" dirty="0" err="1" smtClean="0"/>
+              <a:t>listview</a:t>
+            </a:r>
+            <a:r>
+              <a:rPr lang="en-AU" baseline="0" dirty="0" smtClean="0"/>
+              <a:t> type control</a:t>
+            </a:r>
+          </a:p>
+          <a:p>
+            <a:endParaRPr lang="en-AU" baseline="0" dirty="0" smtClean="0"/>
+          </a:p>
+          <a:p>
+            <a:endParaRPr lang="en-AU" baseline="0" dirty="0" smtClean="0"/>
+          </a:p>
+          <a:p>
+            <a:r>
+              <a:rPr lang="en-AU" baseline="0" dirty="0" smtClean="0"/>
+              <a:t>Create </a:t>
+            </a:r>
+            <a:r>
+              <a:rPr lang="en-AU" baseline="0" dirty="0" err="1" smtClean="0"/>
+              <a:t>theNavBar</a:t>
+            </a:r>
+            <a:endParaRPr lang="en-AU" baseline="0" dirty="0" smtClean="0"/>
+          </a:p>
+          <a:p>
+            <a:r>
+              <a:rPr lang="en-AU" baseline="0" dirty="0" smtClean="0"/>
+              <a:t> - </a:t>
+            </a:r>
+            <a:r>
+              <a:rPr lang="en-AU" baseline="0" dirty="0" err="1" smtClean="0"/>
+              <a:t>WinJS.UI.NavBar</a:t>
+            </a:r>
+            <a:endParaRPr lang="en-AU" baseline="0" dirty="0" smtClean="0"/>
+          </a:p>
+          <a:p>
+            <a:r>
+              <a:rPr lang="en-AU" baseline="0" dirty="0" smtClean="0"/>
+              <a:t> - </a:t>
+            </a:r>
+            <a:r>
+              <a:rPr lang="en-AU" baseline="0" dirty="0" err="1" smtClean="0"/>
+              <a:t>WinJS.UI.NavBarContainer</a:t>
+            </a:r>
+            <a:endParaRPr lang="en-AU" baseline="0" dirty="0" smtClean="0"/>
+          </a:p>
+          <a:p>
+            <a:r>
+              <a:rPr lang="en-AU" baseline="0" dirty="0" smtClean="0"/>
+              <a:t> - </a:t>
+            </a:r>
+            <a:r>
+              <a:rPr lang="en-AU" baseline="0" dirty="0" err="1" smtClean="0"/>
+              <a:t>WinJS.UI.NavBarCommand</a:t>
+            </a:r>
             <a:endParaRPr lang="en-NZ" dirty="0"/>
           </a:p>
         </p:txBody>
@@ -5858,14 +6053,14 @@
       </p:sp>
       <p:sp>
         <p:nvSpPr>
-          <p:cNvPr id="5" name="TextBox 4"/>
+          <p:cNvPr id="7" name="TextBox 6"/>
           <p:cNvSpPr txBox="1"/>
           <p:nvPr/>
         </p:nvSpPr>
         <p:spPr>
           <a:xfrm>
-            <a:off x="612512" y="1771471"/>
-            <a:ext cx="2736262" cy="3416320"/>
+            <a:off x="609599" y="3485346"/>
+            <a:ext cx="4812343" cy="2554545"/>
           </a:xfrm>
           <a:prstGeom prst="rect">
             <a:avLst/>
@@ -5883,22 +6078,52 @@
               <a:buChar char="•"/>
             </a:pPr>
             <a:r>
-              <a:rPr lang="en-NZ" sz="2400" smtClean="0">
-                <a:solidFill>
-                  <a:srgbClr val="3A537B"/>
-                </a:solidFill>
-                <a:latin typeface="Segoe UI Semilight" panose="020B0402040204020203" pitchFamily="34" charset="0"/>
-                <a:cs typeface="Segoe UI Semilight" panose="020B0402040204020203" pitchFamily="34" charset="0"/>
-              </a:rPr>
-              <a:t>Hub Control</a:t>
-            </a:r>
-          </a:p>
-          <a:p>
-            <a:pPr marL="742950" lvl="1" indent="-285750">
-              <a:buFont typeface="Arial" panose="020B0604020202020204" pitchFamily="34" charset="0"/>
-              <a:buChar char="•"/>
-            </a:pPr>
-            <a:endParaRPr lang="en-NZ" sz="2400" smtClean="0">
+              <a:rPr lang="en-NZ" sz="3200" dirty="0" smtClean="0">
+                <a:solidFill>
+                  <a:srgbClr val="3A537B"/>
+                </a:solidFill>
+                <a:latin typeface="Segoe UI Semilight" panose="020B0402040204020203" pitchFamily="34" charset="0"/>
+                <a:cs typeface="Segoe UI Semilight" panose="020B0402040204020203" pitchFamily="34" charset="0"/>
+              </a:rPr>
+              <a:t>Hub </a:t>
+            </a:r>
+            <a:r>
+              <a:rPr lang="en-NZ" sz="3200" dirty="0" smtClean="0">
+                <a:solidFill>
+                  <a:srgbClr val="3A537B"/>
+                </a:solidFill>
+                <a:latin typeface="Segoe UI Semilight" panose="020B0402040204020203" pitchFamily="34" charset="0"/>
+                <a:cs typeface="Segoe UI Semilight" panose="020B0402040204020203" pitchFamily="34" charset="0"/>
+              </a:rPr>
+              <a:t>Control</a:t>
+            </a:r>
+          </a:p>
+          <a:p>
+            <a:pPr marL="285750" indent="-285750">
+              <a:buFont typeface="Arial" panose="020B0604020202020204" pitchFamily="34" charset="0"/>
+              <a:buChar char="•"/>
+            </a:pPr>
+            <a:r>
+              <a:rPr lang="en-NZ" sz="3200" dirty="0" smtClean="0">
+                <a:solidFill>
+                  <a:srgbClr val="3A537B"/>
+                </a:solidFill>
+                <a:latin typeface="Segoe UI Semilight" panose="020B0402040204020203" pitchFamily="34" charset="0"/>
+                <a:cs typeface="Segoe UI Semilight" panose="020B0402040204020203" pitchFamily="34" charset="0"/>
+              </a:rPr>
+              <a:t>Search </a:t>
+            </a:r>
+            <a:r>
+              <a:rPr lang="en-NZ" sz="3200" dirty="0" smtClean="0">
+                <a:solidFill>
+                  <a:srgbClr val="3A537B"/>
+                </a:solidFill>
+                <a:latin typeface="Segoe UI Semilight" panose="020B0402040204020203" pitchFamily="34" charset="0"/>
+                <a:cs typeface="Segoe UI Semilight" panose="020B0402040204020203" pitchFamily="34" charset="0"/>
+              </a:rPr>
+              <a:t>box</a:t>
+            </a:r>
+            <a:endParaRPr lang="en-NZ" sz="3200" dirty="0" smtClean="0">
               <a:solidFill>
                 <a:srgbClr val="3A537B"/>
               </a:solidFill>
@@ -5912,32 +6137,16 @@
               <a:buChar char="•"/>
             </a:pPr>
             <a:r>
-              <a:rPr lang="en-NZ" sz="2400" smtClean="0">
-                <a:solidFill>
-                  <a:srgbClr val="3A537B"/>
-                </a:solidFill>
-                <a:latin typeface="Segoe UI Semilight" panose="020B0402040204020203" pitchFamily="34" charset="0"/>
-                <a:cs typeface="Segoe UI Semilight" panose="020B0402040204020203" pitchFamily="34" charset="0"/>
-              </a:rPr>
-              <a:t>Search box – </a:t>
-            </a:r>
-            <a:r>
-              <a:rPr lang="en-NZ" smtClean="0">
-                <a:solidFill>
-                  <a:srgbClr val="3A537B"/>
-                </a:solidFill>
-                <a:latin typeface="Segoe UI Semilight" panose="020B0402040204020203" pitchFamily="34" charset="0"/>
-                <a:cs typeface="Segoe UI Semilight" panose="020B0402040204020203" pitchFamily="34" charset="0"/>
-              </a:rPr>
-              <a:t>why?</a:t>
-            </a:r>
-          </a:p>
-          <a:p>
-            <a:pPr marL="285750" indent="-285750">
-              <a:buFont typeface="Arial" panose="020B0604020202020204" pitchFamily="34" charset="0"/>
-              <a:buChar char="•"/>
-            </a:pPr>
-            <a:endParaRPr lang="en-NZ" sz="2400" smtClean="0">
+              <a:rPr lang="en-NZ" sz="3200" dirty="0" err="1" smtClean="0">
+                <a:solidFill>
+                  <a:srgbClr val="3A537B"/>
+                </a:solidFill>
+                <a:latin typeface="Segoe UI Semilight" panose="020B0402040204020203" pitchFamily="34" charset="0"/>
+                <a:cs typeface="Segoe UI Semilight" panose="020B0402040204020203" pitchFamily="34" charset="0"/>
+              </a:rPr>
+              <a:t>BackButton</a:t>
+            </a:r>
+            <a:endParaRPr lang="en-NZ" sz="3200" dirty="0" smtClean="0">
               <a:solidFill>
                 <a:srgbClr val="3A537B"/>
               </a:solidFill>
@@ -5951,22 +6160,16 @@
               <a:buChar char="•"/>
             </a:pPr>
             <a:r>
-              <a:rPr lang="en-NZ" sz="2400" smtClean="0">
-                <a:solidFill>
-                  <a:srgbClr val="3A537B"/>
-                </a:solidFill>
-                <a:latin typeface="Segoe UI Semilight" panose="020B0402040204020203" pitchFamily="34" charset="0"/>
-                <a:cs typeface="Segoe UI Semilight" panose="020B0402040204020203" pitchFamily="34" charset="0"/>
-              </a:rPr>
-              <a:t>BackButton</a:t>
-            </a:r>
-          </a:p>
-          <a:p>
-            <a:pPr marL="285750" indent="-285750">
-              <a:buFont typeface="Arial" panose="020B0604020202020204" pitchFamily="34" charset="0"/>
-              <a:buChar char="•"/>
-            </a:pPr>
-            <a:endParaRPr lang="en-NZ" sz="2400" smtClean="0">
+              <a:rPr lang="en-NZ" sz="3200" dirty="0" smtClean="0">
+                <a:solidFill>
+                  <a:srgbClr val="3A537B"/>
+                </a:solidFill>
+                <a:latin typeface="Segoe UI Semilight" panose="020B0402040204020203" pitchFamily="34" charset="0"/>
+                <a:cs typeface="Segoe UI Semilight" panose="020B0402040204020203" pitchFamily="34" charset="0"/>
+              </a:rPr>
+              <a:t>Repeater/Item Container</a:t>
+            </a:r>
+            <a:endParaRPr lang="en-NZ" sz="3200" dirty="0" smtClean="0">
               <a:solidFill>
                 <a:srgbClr val="3A537B"/>
               </a:solidFill>
@@ -5980,22 +6183,16 @@
               <a:buChar char="•"/>
             </a:pPr>
             <a:r>
-              <a:rPr lang="en-NZ" sz="2400" smtClean="0">
-                <a:solidFill>
-                  <a:srgbClr val="3A537B"/>
-                </a:solidFill>
-                <a:latin typeface="Segoe UI Semilight" panose="020B0402040204020203" pitchFamily="34" charset="0"/>
-                <a:cs typeface="Segoe UI Semilight" panose="020B0402040204020203" pitchFamily="34" charset="0"/>
-              </a:rPr>
-              <a:t>Repeater</a:t>
-            </a:r>
-          </a:p>
-          <a:p>
-            <a:pPr marL="285750" indent="-285750">
-              <a:buFont typeface="Arial" panose="020B0604020202020204" pitchFamily="34" charset="0"/>
-              <a:buChar char="•"/>
-            </a:pPr>
-            <a:endParaRPr lang="en-NZ" sz="2400" smtClean="0">
+              <a:rPr lang="en-NZ" sz="3200" dirty="0" err="1" smtClean="0">
+                <a:solidFill>
+                  <a:srgbClr val="3A537B"/>
+                </a:solidFill>
+                <a:latin typeface="Segoe UI Semilight" panose="020B0402040204020203" pitchFamily="34" charset="0"/>
+                <a:cs typeface="Segoe UI Semilight" panose="020B0402040204020203" pitchFamily="34" charset="0"/>
+              </a:rPr>
+              <a:t>Navbar</a:t>
+            </a:r>
+            <a:endParaRPr lang="en-NZ" sz="3200" dirty="0" smtClean="0">
               <a:solidFill>
                 <a:srgbClr val="3A537B"/>
               </a:solidFill>
@@ -6003,22 +6200,94 @@
               <a:cs typeface="Segoe UI Semilight" panose="020B0402040204020203" pitchFamily="34" charset="0"/>
             </a:endParaRPr>
           </a:p>
+        </p:txBody>
+      </p:sp>
+      <p:sp>
+        <p:nvSpPr>
+          <p:cNvPr id="8" name="TextBox 7"/>
+          <p:cNvSpPr txBox="1"/>
+          <p:nvPr/>
+        </p:nvSpPr>
+        <p:spPr>
+          <a:xfrm>
+            <a:off x="609599" y="1405354"/>
+            <a:ext cx="3936912" cy="1569660"/>
+          </a:xfrm>
+          <a:prstGeom prst="rect">
+            <a:avLst/>
+          </a:prstGeom>
+          <a:noFill/>
+        </p:spPr>
+        <p:txBody>
+          <a:bodyPr wrap="none" rtlCol="0">
+            <a:spAutoFit/>
+          </a:bodyPr>
+          <a:lstStyle/>
           <a:p>
             <a:pPr marL="285750" indent="-285750">
               <a:buFont typeface="Arial" panose="020B0604020202020204" pitchFamily="34" charset="0"/>
               <a:buChar char="•"/>
             </a:pPr>
             <a:r>
-              <a:rPr lang="en-NZ" sz="2400" smtClean="0">
-                <a:solidFill>
-                  <a:srgbClr val="3A537B"/>
-                </a:solidFill>
-                <a:latin typeface="Segoe UI Semilight" panose="020B0402040204020203" pitchFamily="34" charset="0"/>
-                <a:cs typeface="Segoe UI Semilight" panose="020B0402040204020203" pitchFamily="34" charset="0"/>
-              </a:rPr>
-              <a:t>Navbar</a:t>
-            </a:r>
-            <a:endParaRPr lang="en-NZ" sz="2400" dirty="0" smtClean="0">
+              <a:rPr lang="en-AU" sz="3200" dirty="0" smtClean="0">
+                <a:solidFill>
+                  <a:srgbClr val="3A537B"/>
+                </a:solidFill>
+                <a:latin typeface="Segoe UI Semilight" panose="020B0402040204020203" pitchFamily="34" charset="0"/>
+                <a:cs typeface="Segoe UI Semilight" panose="020B0402040204020203" pitchFamily="34" charset="0"/>
+              </a:rPr>
+              <a:t>Hub Template</a:t>
+            </a:r>
+            <a:endParaRPr lang="en-NZ" sz="3200" dirty="0" smtClean="0">
+              <a:solidFill>
+                <a:srgbClr val="3A537B"/>
+              </a:solidFill>
+              <a:latin typeface="Segoe UI Semilight" panose="020B0402040204020203" pitchFamily="34" charset="0"/>
+              <a:cs typeface="Segoe UI Semilight" panose="020B0402040204020203" pitchFamily="34" charset="0"/>
+            </a:endParaRPr>
+          </a:p>
+          <a:p>
+            <a:pPr marL="285750" indent="-285750">
+              <a:buFont typeface="Arial" panose="020B0604020202020204" pitchFamily="34" charset="0"/>
+              <a:buChar char="•"/>
+            </a:pPr>
+            <a:r>
+              <a:rPr lang="en-AU" sz="3200" dirty="0" smtClean="0">
+                <a:solidFill>
+                  <a:srgbClr val="3A537B"/>
+                </a:solidFill>
+                <a:latin typeface="Segoe UI Semilight" panose="020B0402040204020203" pitchFamily="34" charset="0"/>
+                <a:cs typeface="Segoe UI Semilight" panose="020B0402040204020203" pitchFamily="34" charset="0"/>
+              </a:rPr>
+              <a:t>Fixed Layout (gone)</a:t>
+            </a:r>
+          </a:p>
+          <a:p>
+            <a:pPr marL="285750" indent="-285750">
+              <a:buFont typeface="Arial" panose="020B0604020202020204" pitchFamily="34" charset="0"/>
+              <a:buChar char="•"/>
+            </a:pPr>
+            <a:r>
+              <a:rPr lang="en-AU" sz="3200" dirty="0" smtClean="0">
+                <a:solidFill>
+                  <a:srgbClr val="3A537B"/>
+                </a:solidFill>
+                <a:latin typeface="Segoe UI Semilight" panose="020B0402040204020203" pitchFamily="34" charset="0"/>
+                <a:cs typeface="Segoe UI Semilight" panose="020B0402040204020203" pitchFamily="34" charset="0"/>
+              </a:rPr>
+              <a:t>CSS Media </a:t>
+            </a:r>
+            <a:r>
+              <a:rPr lang="en-AU" sz="3200" dirty="0" smtClean="0">
+                <a:solidFill>
+                  <a:srgbClr val="3A537B"/>
+                </a:solidFill>
+                <a:latin typeface="Segoe UI Semilight" panose="020B0402040204020203" pitchFamily="34" charset="0"/>
+                <a:cs typeface="Segoe UI Semilight" panose="020B0402040204020203" pitchFamily="34" charset="0"/>
+              </a:rPr>
+              <a:t>queries</a:t>
+            </a:r>
+            <a:endParaRPr lang="en-NZ" sz="3200" dirty="0" smtClean="0">
               <a:solidFill>
                 <a:srgbClr val="3A537B"/>
               </a:solidFill>
@@ -6486,17 +6755,7 @@
                 <a:latin typeface="Segoe UI Semilight" panose="020B0402040204020203" pitchFamily="34" charset="0"/>
                 <a:cs typeface="Segoe UI Semilight" panose="020B0402040204020203" pitchFamily="34" charset="0"/>
               </a:rPr>
-              <a:t>Wintellect</a:t>
-            </a:r>
-            <a:r>
-              <a:rPr lang="en-NZ" sz="2400" dirty="0" err="1" smtClean="0">
-                <a:solidFill>
-                  <a:srgbClr val="3A537B"/>
-                </a:solidFill>
-                <a:latin typeface="Segoe UI Semilight" panose="020B0402040204020203" pitchFamily="34" charset="0"/>
-                <a:cs typeface="Segoe UI Semilight" panose="020B0402040204020203" pitchFamily="34" charset="0"/>
-              </a:rPr>
-              <a:t>’s</a:t>
+              <a:t>Wintellect’s</a:t>
             </a:r>
             <a:r>
               <a:rPr lang="en-NZ" sz="2400" dirty="0" smtClean="0">
@@ -7869,17 +8128,7 @@
                 <a:latin typeface="Segoe UI Semilight" panose="020B0402040204020203" pitchFamily="34" charset="0"/>
                 <a:cs typeface="Segoe UI Semilight" panose="020B0402040204020203" pitchFamily="34" charset="0"/>
               </a:rPr>
-              <a:t>Start </a:t>
-            </a:r>
-            <a:r>
-              <a:rPr lang="en-NZ" sz="2400" dirty="0" smtClean="0">
-                <a:solidFill>
-                  <a:srgbClr val="3A537B"/>
-                </a:solidFill>
-                <a:latin typeface="Segoe UI Semilight" panose="020B0402040204020203" pitchFamily="34" charset="0"/>
-                <a:cs typeface="Segoe UI Semilight" panose="020B0402040204020203" pitchFamily="34" charset="0"/>
-              </a:rPr>
-              <a:t>Screen</a:t>
+              <a:t>Start Screen</a:t>
             </a:r>
             <a:endParaRPr lang="en-NZ" sz="2000" dirty="0" smtClean="0">
               <a:solidFill>
@@ -8036,13 +8285,6 @@
               </a:rPr>
               <a:t>Share</a:t>
             </a:r>
-            <a:endParaRPr lang="en-NZ" sz="2400" dirty="0" smtClean="0">
-              <a:solidFill>
-                <a:srgbClr val="3A537B"/>
-              </a:solidFill>
-              <a:latin typeface="Segoe UI Semilight" panose="020B0402040204020203" pitchFamily="34" charset="0"/>
-              <a:cs typeface="Segoe UI Semilight" panose="020B0402040204020203" pitchFamily="34" charset="0"/>
-            </a:endParaRPr>
           </a:p>
           <a:p>
             <a:pPr marL="742950" lvl="1" indent="-285750">
@@ -10499,6 +10741,15 @@
 </file>
 
 <file path=customXml/item1.xml><?xml version="1.0" encoding="utf-8"?>
+<?mso-contentType ?>
+<FormTemplates xmlns="http://schemas.microsoft.com/sharepoint/v3/contenttype/forms">
+  <Display>DocumentLibraryForm</Display>
+  <Edit>DocumentLibraryForm</Edit>
+  <New>DocumentLibraryForm</New>
+</FormTemplates>
+</file>
+
+<file path=customXml/item2.xml><?xml version="1.0" encoding="utf-8"?>
 <ct:contentTypeSchema xmlns:ct="http://schemas.microsoft.com/office/2006/metadata/contentType" xmlns:ma="http://schemas.microsoft.com/office/2006/metadata/properties/metaAttributes" ct:_="" ma:_="" ma:contentTypeName="Document" ma:contentTypeID="0x0101004DF6D0871B95904AABD22536D8AC85C8" ma:contentTypeVersion="0" ma:contentTypeDescription="Create a new document." ma:contentTypeScope="" ma:versionID="49efcf3338630220492e4247eaca93e8">
   <xsd:schema xmlns:xsd="http://www.w3.org/2001/XMLSchema" xmlns:p="http://schemas.microsoft.com/office/2006/metadata/properties" targetNamespace="http://schemas.microsoft.com/office/2006/metadata/properties" ma:root="true" ma:fieldsID="4aeb20c0e3442673af7ee10786458764">
     <xsd:element name="properties">
@@ -10547,15 +10798,6 @@
 </ct:contentTypeSchema>
 </file>
 
-<file path=customXml/item2.xml><?xml version="1.0" encoding="utf-8"?>
-<?mso-contentType ?>
-<FormTemplates xmlns="http://schemas.microsoft.com/sharepoint/v3/contenttype/forms">
-  <Display>DocumentLibraryForm</Display>
-  <Edit>DocumentLibraryForm</Edit>
-  <New>DocumentLibraryForm</New>
-</FormTemplates>
-</file>
-
 <file path=customXml/item3.xml><?xml version="1.0" encoding="utf-8"?>
 <p:properties xmlns:p="http://schemas.microsoft.com/office/2006/metadata/properties" xmlns:xsi="http://www.w3.org/2001/XMLSchema-instance">
   <documentManagement/>
@@ -10563,6 +10805,14 @@
 </file>
 
 <file path=customXml/itemProps1.xml><?xml version="1.0" encoding="utf-8"?>
+<ds:datastoreItem xmlns:ds="http://schemas.openxmlformats.org/officeDocument/2006/customXml" ds:itemID="{1AB3DE77-6CAF-498C-8660-15E14EE16CD7}">
+  <ds:schemaRefs>
+    <ds:schemaRef ds:uri="http://schemas.microsoft.com/sharepoint/v3/contenttype/forms"/>
+  </ds:schemaRefs>
+</ds:datastoreItem>
+</file>
+
+<file path=customXml/itemProps2.xml><?xml version="1.0" encoding="utf-8"?>
 <ds:datastoreItem xmlns:ds="http://schemas.openxmlformats.org/officeDocument/2006/customXml" ds:itemID="{7E1D9E91-416C-4888-A8AA-BE42FEF97FEF}">
   <ds:schemaRefs>
     <ds:schemaRef ds:uri="http://schemas.microsoft.com/office/2006/metadata/contentType"/>
@@ -10577,14 +10827,6 @@
 </ds:datastoreItem>
 </file>
 
-<file path=customXml/itemProps2.xml><?xml version="1.0" encoding="utf-8"?>
-<ds:datastoreItem xmlns:ds="http://schemas.openxmlformats.org/officeDocument/2006/customXml" ds:itemID="{1AB3DE77-6CAF-498C-8660-15E14EE16CD7}">
-  <ds:schemaRefs>
-    <ds:schemaRef ds:uri="http://schemas.microsoft.com/sharepoint/v3/contenttype/forms"/>
-  </ds:schemaRefs>
-</ds:datastoreItem>
-</file>
-
 <file path=customXml/itemProps3.xml><?xml version="1.0" encoding="utf-8"?>
 <ds:datastoreItem xmlns:ds="http://schemas.openxmlformats.org/officeDocument/2006/customXml" ds:itemID="{AEBD4C7A-EE81-430E-8E48-8F597B2AAF83}">
   <ds:schemaRefs>

</xml_diff>